<commit_message>
opengl: vertex array and layout
</commit_message>
<xml_diff>
--- a/docs/tutorial-opengl/assets/figures.pptx
+++ b/docs/tutorial-opengl/assets/figures.pptx
@@ -9,6 +9,8 @@
     <p:sldId id="257" r:id="rId3"/>
     <p:sldId id="258" r:id="rId4"/>
     <p:sldId id="259" r:id="rId5"/>
+    <p:sldId id="260" r:id="rId6"/>
+    <p:sldId id="261" r:id="rId7"/>
   </p:sldIdLst>
   <p:sldSz cx="12192000" cy="6858000"/>
   <p:notesSz cx="6858000" cy="9144000"/>
@@ -264,7 +266,7 @@
           <a:p>
             <a:fld id="{5ED19601-7AAA-4ADB-9403-46F6CC5497EC}" type="datetimeFigureOut">
               <a:rPr lang="en-US" smtClean="0"/>
-              <a:t>7/1/2024</a:t>
+              <a:t>7/3/2024</a:t>
             </a:fld>
             <a:endParaRPr lang="en-US"/>
           </a:p>
@@ -464,7 +466,7 @@
           <a:p>
             <a:fld id="{5ED19601-7AAA-4ADB-9403-46F6CC5497EC}" type="datetimeFigureOut">
               <a:rPr lang="en-US" smtClean="0"/>
-              <a:t>7/1/2024</a:t>
+              <a:t>7/3/2024</a:t>
             </a:fld>
             <a:endParaRPr lang="en-US"/>
           </a:p>
@@ -674,7 +676,7 @@
           <a:p>
             <a:fld id="{5ED19601-7AAA-4ADB-9403-46F6CC5497EC}" type="datetimeFigureOut">
               <a:rPr lang="en-US" smtClean="0"/>
-              <a:t>7/1/2024</a:t>
+              <a:t>7/3/2024</a:t>
             </a:fld>
             <a:endParaRPr lang="en-US"/>
           </a:p>
@@ -874,7 +876,7 @@
           <a:p>
             <a:fld id="{5ED19601-7AAA-4ADB-9403-46F6CC5497EC}" type="datetimeFigureOut">
               <a:rPr lang="en-US" smtClean="0"/>
-              <a:t>7/1/2024</a:t>
+              <a:t>7/3/2024</a:t>
             </a:fld>
             <a:endParaRPr lang="en-US"/>
           </a:p>
@@ -1150,7 +1152,7 @@
           <a:p>
             <a:fld id="{5ED19601-7AAA-4ADB-9403-46F6CC5497EC}" type="datetimeFigureOut">
               <a:rPr lang="en-US" smtClean="0"/>
-              <a:t>7/1/2024</a:t>
+              <a:t>7/3/2024</a:t>
             </a:fld>
             <a:endParaRPr lang="en-US"/>
           </a:p>
@@ -1418,7 +1420,7 @@
           <a:p>
             <a:fld id="{5ED19601-7AAA-4ADB-9403-46F6CC5497EC}" type="datetimeFigureOut">
               <a:rPr lang="en-US" smtClean="0"/>
-              <a:t>7/1/2024</a:t>
+              <a:t>7/3/2024</a:t>
             </a:fld>
             <a:endParaRPr lang="en-US"/>
           </a:p>
@@ -1833,7 +1835,7 @@
           <a:p>
             <a:fld id="{5ED19601-7AAA-4ADB-9403-46F6CC5497EC}" type="datetimeFigureOut">
               <a:rPr lang="en-US" smtClean="0"/>
-              <a:t>7/1/2024</a:t>
+              <a:t>7/3/2024</a:t>
             </a:fld>
             <a:endParaRPr lang="en-US"/>
           </a:p>
@@ -1975,7 +1977,7 @@
           <a:p>
             <a:fld id="{5ED19601-7AAA-4ADB-9403-46F6CC5497EC}" type="datetimeFigureOut">
               <a:rPr lang="en-US" smtClean="0"/>
-              <a:t>7/1/2024</a:t>
+              <a:t>7/3/2024</a:t>
             </a:fld>
             <a:endParaRPr lang="en-US"/>
           </a:p>
@@ -2088,7 +2090,7 @@
           <a:p>
             <a:fld id="{5ED19601-7AAA-4ADB-9403-46F6CC5497EC}" type="datetimeFigureOut">
               <a:rPr lang="en-US" smtClean="0"/>
-              <a:t>7/1/2024</a:t>
+              <a:t>7/3/2024</a:t>
             </a:fld>
             <a:endParaRPr lang="en-US"/>
           </a:p>
@@ -2401,7 +2403,7 @@
           <a:p>
             <a:fld id="{5ED19601-7AAA-4ADB-9403-46F6CC5497EC}" type="datetimeFigureOut">
               <a:rPr lang="en-US" smtClean="0"/>
-              <a:t>7/1/2024</a:t>
+              <a:t>7/3/2024</a:t>
             </a:fld>
             <a:endParaRPr lang="en-US"/>
           </a:p>
@@ -2690,7 +2692,7 @@
           <a:p>
             <a:fld id="{5ED19601-7AAA-4ADB-9403-46F6CC5497EC}" type="datetimeFigureOut">
               <a:rPr lang="en-US" smtClean="0"/>
-              <a:t>7/1/2024</a:t>
+              <a:t>7/3/2024</a:t>
             </a:fld>
             <a:endParaRPr lang="en-US"/>
           </a:p>
@@ -2933,7 +2935,7 @@
           <a:p>
             <a:fld id="{5ED19601-7AAA-4ADB-9403-46F6CC5497EC}" type="datetimeFigureOut">
               <a:rPr lang="en-US" smtClean="0"/>
-              <a:t>7/1/2024</a:t>
+              <a:t>7/3/2024</a:t>
             </a:fld>
             <a:endParaRPr lang="en-US"/>
           </a:p>
@@ -12403,6 +12405,2499 @@
 </p:sld>
 </file>
 
+<file path=ppt/slides/slide5.xml><?xml version="1.0" encoding="utf-8"?>
+<p:sld xmlns:a="http://schemas.openxmlformats.org/drawingml/2006/main" xmlns:r="http://schemas.openxmlformats.org/officeDocument/2006/relationships" xmlns:p="http://schemas.openxmlformats.org/presentationml/2006/main">
+  <p:cSld>
+    <p:spTree>
+      <p:nvGrpSpPr>
+        <p:cNvPr id="1" name=""/>
+        <p:cNvGrpSpPr/>
+        <p:nvPr/>
+      </p:nvGrpSpPr>
+      <p:grpSpPr>
+        <a:xfrm>
+          <a:off x="0" y="0"/>
+          <a:ext cx="0" cy="0"/>
+          <a:chOff x="0" y="0"/>
+          <a:chExt cx="0" cy="0"/>
+        </a:xfrm>
+      </p:grpSpPr>
+      <p:sp>
+        <p:nvSpPr>
+          <p:cNvPr id="4" name="타원 3">
+            <a:extLst>
+              <a:ext uri="{FF2B5EF4-FFF2-40B4-BE49-F238E27FC236}">
+                <a16:creationId xmlns:a16="http://schemas.microsoft.com/office/drawing/2014/main" id="{3E9641D9-C384-4F68-824C-3F74BB78B4B2}"/>
+              </a:ext>
+            </a:extLst>
+          </p:cNvPr>
+          <p:cNvSpPr/>
+          <p:nvPr/>
+        </p:nvSpPr>
+        <p:spPr>
+          <a:xfrm>
+            <a:off x="1522870" y="2761917"/>
+            <a:ext cx="138023" cy="138023"/>
+          </a:xfrm>
+          <a:prstGeom prst="ellipse">
+            <a:avLst/>
+          </a:prstGeom>
+          <a:solidFill>
+            <a:srgbClr val="FF0000"/>
+          </a:solidFill>
+          <a:ln>
+            <a:solidFill>
+              <a:schemeClr val="tx1"/>
+            </a:solidFill>
+          </a:ln>
+        </p:spPr>
+        <p:style>
+          <a:lnRef idx="2">
+            <a:schemeClr val="accent1">
+              <a:shade val="50000"/>
+            </a:schemeClr>
+          </a:lnRef>
+          <a:fillRef idx="1">
+            <a:schemeClr val="accent1"/>
+          </a:fillRef>
+          <a:effectRef idx="0">
+            <a:schemeClr val="accent1"/>
+          </a:effectRef>
+          <a:fontRef idx="minor">
+            <a:schemeClr val="lt1"/>
+          </a:fontRef>
+        </p:style>
+        <p:txBody>
+          <a:bodyPr rtlCol="0" anchor="ctr"/>
+          <a:lstStyle/>
+          <a:p>
+            <a:pPr algn="ctr"/>
+            <a:endParaRPr lang="ko-KR" altLang="en-US"/>
+          </a:p>
+        </p:txBody>
+      </p:sp>
+      <p:sp>
+        <p:nvSpPr>
+          <p:cNvPr id="5" name="타원 4">
+            <a:extLst>
+              <a:ext uri="{FF2B5EF4-FFF2-40B4-BE49-F238E27FC236}">
+                <a16:creationId xmlns:a16="http://schemas.microsoft.com/office/drawing/2014/main" id="{404D07C7-588D-4064-9D6F-E0CA321B3412}"/>
+              </a:ext>
+            </a:extLst>
+          </p:cNvPr>
+          <p:cNvSpPr/>
+          <p:nvPr/>
+        </p:nvSpPr>
+        <p:spPr>
+          <a:xfrm>
+            <a:off x="1537247" y="1498471"/>
+            <a:ext cx="138023" cy="138023"/>
+          </a:xfrm>
+          <a:prstGeom prst="ellipse">
+            <a:avLst/>
+          </a:prstGeom>
+          <a:solidFill>
+            <a:srgbClr val="CC334D"/>
+          </a:solidFill>
+          <a:ln>
+            <a:solidFill>
+              <a:schemeClr val="tx1"/>
+            </a:solidFill>
+          </a:ln>
+        </p:spPr>
+        <p:style>
+          <a:lnRef idx="2">
+            <a:schemeClr val="accent1">
+              <a:shade val="50000"/>
+            </a:schemeClr>
+          </a:lnRef>
+          <a:fillRef idx="1">
+            <a:schemeClr val="accent1"/>
+          </a:fillRef>
+          <a:effectRef idx="0">
+            <a:schemeClr val="accent1"/>
+          </a:effectRef>
+          <a:fontRef idx="minor">
+            <a:schemeClr val="lt1"/>
+          </a:fontRef>
+        </p:style>
+        <p:txBody>
+          <a:bodyPr rtlCol="0" anchor="ctr"/>
+          <a:lstStyle/>
+          <a:p>
+            <a:pPr algn="ctr"/>
+            <a:endParaRPr lang="ko-KR" altLang="en-US"/>
+          </a:p>
+        </p:txBody>
+      </p:sp>
+      <p:sp>
+        <p:nvSpPr>
+          <p:cNvPr id="6" name="타원 5">
+            <a:extLst>
+              <a:ext uri="{FF2B5EF4-FFF2-40B4-BE49-F238E27FC236}">
+                <a16:creationId xmlns:a16="http://schemas.microsoft.com/office/drawing/2014/main" id="{30380797-AC9D-4220-81B8-5AF1EF934350}"/>
+              </a:ext>
+            </a:extLst>
+          </p:cNvPr>
+          <p:cNvSpPr/>
+          <p:nvPr/>
+        </p:nvSpPr>
+        <p:spPr>
+          <a:xfrm>
+            <a:off x="2996966" y="1498471"/>
+            <a:ext cx="138023" cy="138023"/>
+          </a:xfrm>
+          <a:prstGeom prst="ellipse">
+            <a:avLst/>
+          </a:prstGeom>
+          <a:solidFill>
+            <a:srgbClr val="0000FF"/>
+          </a:solidFill>
+          <a:ln>
+            <a:solidFill>
+              <a:schemeClr val="tx1"/>
+            </a:solidFill>
+          </a:ln>
+        </p:spPr>
+        <p:style>
+          <a:lnRef idx="2">
+            <a:schemeClr val="accent1">
+              <a:shade val="50000"/>
+            </a:schemeClr>
+          </a:lnRef>
+          <a:fillRef idx="1">
+            <a:schemeClr val="accent1"/>
+          </a:fillRef>
+          <a:effectRef idx="0">
+            <a:schemeClr val="accent1"/>
+          </a:effectRef>
+          <a:fontRef idx="minor">
+            <a:schemeClr val="lt1"/>
+          </a:fontRef>
+        </p:style>
+        <p:txBody>
+          <a:bodyPr rtlCol="0" anchor="ctr"/>
+          <a:lstStyle/>
+          <a:p>
+            <a:pPr algn="ctr"/>
+            <a:endParaRPr lang="ko-KR" altLang="en-US"/>
+          </a:p>
+        </p:txBody>
+      </p:sp>
+      <p:sp>
+        <p:nvSpPr>
+          <p:cNvPr id="7" name="타원 6">
+            <a:extLst>
+              <a:ext uri="{FF2B5EF4-FFF2-40B4-BE49-F238E27FC236}">
+                <a16:creationId xmlns:a16="http://schemas.microsoft.com/office/drawing/2014/main" id="{CDA0A39C-87A3-44E2-B109-7A2DA3A02F63}"/>
+              </a:ext>
+            </a:extLst>
+          </p:cNvPr>
+          <p:cNvSpPr/>
+          <p:nvPr/>
+        </p:nvSpPr>
+        <p:spPr>
+          <a:xfrm>
+            <a:off x="2996965" y="2761916"/>
+            <a:ext cx="138023" cy="138023"/>
+          </a:xfrm>
+          <a:prstGeom prst="ellipse">
+            <a:avLst/>
+          </a:prstGeom>
+          <a:solidFill>
+            <a:srgbClr val="00FF00"/>
+          </a:solidFill>
+          <a:ln>
+            <a:solidFill>
+              <a:schemeClr val="tx1"/>
+            </a:solidFill>
+          </a:ln>
+        </p:spPr>
+        <p:style>
+          <a:lnRef idx="2">
+            <a:schemeClr val="accent1">
+              <a:shade val="50000"/>
+            </a:schemeClr>
+          </a:lnRef>
+          <a:fillRef idx="1">
+            <a:schemeClr val="accent1"/>
+          </a:fillRef>
+          <a:effectRef idx="0">
+            <a:schemeClr val="accent1"/>
+          </a:effectRef>
+          <a:fontRef idx="minor">
+            <a:schemeClr val="lt1"/>
+          </a:fontRef>
+        </p:style>
+        <p:txBody>
+          <a:bodyPr rtlCol="0" anchor="ctr"/>
+          <a:lstStyle/>
+          <a:p>
+            <a:pPr algn="ctr"/>
+            <a:endParaRPr lang="ko-KR" altLang="en-US"/>
+          </a:p>
+        </p:txBody>
+      </p:sp>
+      <p:sp>
+        <p:nvSpPr>
+          <p:cNvPr id="8" name="TextBox 7">
+            <a:extLst>
+              <a:ext uri="{FF2B5EF4-FFF2-40B4-BE49-F238E27FC236}">
+                <a16:creationId xmlns:a16="http://schemas.microsoft.com/office/drawing/2014/main" id="{B312ECBA-71DB-4FCE-A1B0-EEBDDCCC01F1}"/>
+              </a:ext>
+            </a:extLst>
+          </p:cNvPr>
+          <p:cNvSpPr txBox="1"/>
+          <p:nvPr/>
+        </p:nvSpPr>
+        <p:spPr>
+          <a:xfrm>
+            <a:off x="375557" y="3059668"/>
+            <a:ext cx="2018501" cy="738664"/>
+          </a:xfrm>
+          <a:prstGeom prst="rect">
+            <a:avLst/>
+          </a:prstGeom>
+          <a:noFill/>
+        </p:spPr>
+        <p:txBody>
+          <a:bodyPr wrap="none" rtlCol="0">
+            <a:spAutoFit/>
+          </a:bodyPr>
+          <a:lstStyle/>
+          <a:p>
+            <a:r>
+              <a:rPr lang="en-US" altLang="ko-KR" sz="1400" b="1" dirty="0"/>
+              <a:t>[0</a:t>
+            </a:r>
+            <a:r>
+              <a:rPr lang="ko-KR" altLang="en-US" sz="1400" b="1" dirty="0"/>
+              <a:t>번 정점</a:t>
+            </a:r>
+            <a:r>
+              <a:rPr lang="en-US" altLang="ko-KR" sz="1400" b="1" dirty="0"/>
+              <a:t>]</a:t>
+            </a:r>
+          </a:p>
+          <a:p>
+            <a:r>
+              <a:rPr lang="ko-KR" altLang="en-US" sz="1400" dirty="0"/>
+              <a:t>위치</a:t>
+            </a:r>
+            <a:r>
+              <a:rPr lang="en-US" altLang="ko-KR" sz="1400" dirty="0"/>
+              <a:t>: (-0.5, -0.5)</a:t>
+            </a:r>
+          </a:p>
+          <a:p>
+            <a:r>
+              <a:rPr lang="ko-KR" altLang="en-US" sz="1400" dirty="0"/>
+              <a:t>색상</a:t>
+            </a:r>
+            <a:r>
+              <a:rPr lang="en-US" altLang="ko-KR" sz="1400" dirty="0"/>
+              <a:t>: (1.0, 0.0, 0.0, 1.0)</a:t>
+            </a:r>
+            <a:endParaRPr lang="ko-KR" altLang="en-US" sz="1400" dirty="0"/>
+          </a:p>
+        </p:txBody>
+      </p:sp>
+      <p:sp>
+        <p:nvSpPr>
+          <p:cNvPr id="9" name="TextBox 8">
+            <a:extLst>
+              <a:ext uri="{FF2B5EF4-FFF2-40B4-BE49-F238E27FC236}">
+                <a16:creationId xmlns:a16="http://schemas.microsoft.com/office/drawing/2014/main" id="{E9FB04C7-F631-486B-BF8C-1E49BD182CD7}"/>
+              </a:ext>
+            </a:extLst>
+          </p:cNvPr>
+          <p:cNvSpPr txBox="1"/>
+          <p:nvPr/>
+        </p:nvSpPr>
+        <p:spPr>
+          <a:xfrm>
+            <a:off x="2996965" y="3059668"/>
+            <a:ext cx="2018501" cy="738664"/>
+          </a:xfrm>
+          <a:prstGeom prst="rect">
+            <a:avLst/>
+          </a:prstGeom>
+          <a:noFill/>
+        </p:spPr>
+        <p:txBody>
+          <a:bodyPr wrap="none" rtlCol="0">
+            <a:spAutoFit/>
+          </a:bodyPr>
+          <a:lstStyle/>
+          <a:p>
+            <a:r>
+              <a:rPr lang="en-US" altLang="ko-KR" sz="1400" b="1" dirty="0"/>
+              <a:t>[1</a:t>
+            </a:r>
+            <a:r>
+              <a:rPr lang="ko-KR" altLang="en-US" sz="1400" b="1" dirty="0"/>
+              <a:t>번 정점</a:t>
+            </a:r>
+            <a:r>
+              <a:rPr lang="en-US" altLang="ko-KR" sz="1400" b="1" dirty="0"/>
+              <a:t>]</a:t>
+            </a:r>
+          </a:p>
+          <a:p>
+            <a:r>
+              <a:rPr lang="ko-KR" altLang="en-US" sz="1400" dirty="0"/>
+              <a:t>위치</a:t>
+            </a:r>
+            <a:r>
+              <a:rPr lang="en-US" altLang="ko-KR" sz="1400" dirty="0"/>
+              <a:t>: (0.5, -0.5)</a:t>
+            </a:r>
+          </a:p>
+          <a:p>
+            <a:r>
+              <a:rPr lang="ko-KR" altLang="en-US" sz="1400" dirty="0"/>
+              <a:t>색상</a:t>
+            </a:r>
+            <a:r>
+              <a:rPr lang="en-US" altLang="ko-KR" sz="1400" dirty="0"/>
+              <a:t>: (0.0, 1.0, 0.0, 1.0)</a:t>
+            </a:r>
+            <a:endParaRPr lang="ko-KR" altLang="en-US" sz="1400" dirty="0"/>
+          </a:p>
+        </p:txBody>
+      </p:sp>
+      <p:sp>
+        <p:nvSpPr>
+          <p:cNvPr id="10" name="TextBox 9">
+            <a:extLst>
+              <a:ext uri="{FF2B5EF4-FFF2-40B4-BE49-F238E27FC236}">
+                <a16:creationId xmlns:a16="http://schemas.microsoft.com/office/drawing/2014/main" id="{93897959-B8B5-4903-908E-61E296452357}"/>
+              </a:ext>
+            </a:extLst>
+          </p:cNvPr>
+          <p:cNvSpPr txBox="1"/>
+          <p:nvPr/>
+        </p:nvSpPr>
+        <p:spPr>
+          <a:xfrm>
+            <a:off x="375557" y="448635"/>
+            <a:ext cx="2018501" cy="738664"/>
+          </a:xfrm>
+          <a:prstGeom prst="rect">
+            <a:avLst/>
+          </a:prstGeom>
+          <a:noFill/>
+        </p:spPr>
+        <p:txBody>
+          <a:bodyPr wrap="none" rtlCol="0">
+            <a:spAutoFit/>
+          </a:bodyPr>
+          <a:lstStyle/>
+          <a:p>
+            <a:r>
+              <a:rPr lang="en-US" altLang="ko-KR" sz="1400" b="1" dirty="0"/>
+              <a:t>[3</a:t>
+            </a:r>
+            <a:r>
+              <a:rPr lang="ko-KR" altLang="en-US" sz="1400" b="1" dirty="0"/>
+              <a:t>번 정점</a:t>
+            </a:r>
+            <a:r>
+              <a:rPr lang="en-US" altLang="ko-KR" sz="1400" b="1" dirty="0"/>
+              <a:t>]</a:t>
+            </a:r>
+          </a:p>
+          <a:p>
+            <a:r>
+              <a:rPr lang="ko-KR" altLang="en-US" sz="1400" dirty="0"/>
+              <a:t>위치</a:t>
+            </a:r>
+            <a:r>
+              <a:rPr lang="en-US" altLang="ko-KR" sz="1400" dirty="0"/>
+              <a:t>: (-0.5, 0.5)</a:t>
+            </a:r>
+          </a:p>
+          <a:p>
+            <a:r>
+              <a:rPr lang="ko-KR" altLang="en-US" sz="1400" dirty="0"/>
+              <a:t>색상</a:t>
+            </a:r>
+            <a:r>
+              <a:rPr lang="en-US" altLang="ko-KR" sz="1400" dirty="0"/>
+              <a:t>: (0.8, 0.2, 0.3, 1.0)</a:t>
+            </a:r>
+            <a:endParaRPr lang="ko-KR" altLang="en-US" sz="1400" dirty="0"/>
+          </a:p>
+        </p:txBody>
+      </p:sp>
+      <p:sp>
+        <p:nvSpPr>
+          <p:cNvPr id="11" name="TextBox 10">
+            <a:extLst>
+              <a:ext uri="{FF2B5EF4-FFF2-40B4-BE49-F238E27FC236}">
+                <a16:creationId xmlns:a16="http://schemas.microsoft.com/office/drawing/2014/main" id="{695356BA-57A3-4481-B068-2B2E1ACEC6B6}"/>
+              </a:ext>
+            </a:extLst>
+          </p:cNvPr>
+          <p:cNvSpPr txBox="1"/>
+          <p:nvPr/>
+        </p:nvSpPr>
+        <p:spPr>
+          <a:xfrm>
+            <a:off x="2996965" y="448635"/>
+            <a:ext cx="1906291" cy="738664"/>
+          </a:xfrm>
+          <a:prstGeom prst="rect">
+            <a:avLst/>
+          </a:prstGeom>
+          <a:noFill/>
+        </p:spPr>
+        <p:txBody>
+          <a:bodyPr wrap="none" rtlCol="0">
+            <a:spAutoFit/>
+          </a:bodyPr>
+          <a:lstStyle/>
+          <a:p>
+            <a:r>
+              <a:rPr lang="en-US" altLang="ko-KR" sz="1400" b="1" dirty="0"/>
+              <a:t>[2</a:t>
+            </a:r>
+            <a:r>
+              <a:rPr lang="ko-KR" altLang="en-US" sz="1400" b="1" dirty="0"/>
+              <a:t>번 정점</a:t>
+            </a:r>
+            <a:r>
+              <a:rPr lang="en-US" altLang="ko-KR" sz="1400" b="1" dirty="0"/>
+              <a:t>]</a:t>
+            </a:r>
+          </a:p>
+          <a:p>
+            <a:r>
+              <a:rPr lang="ko-KR" altLang="en-US" sz="1400" dirty="0"/>
+              <a:t>위치</a:t>
+            </a:r>
+            <a:r>
+              <a:rPr lang="en-US" altLang="ko-KR" sz="1400" dirty="0"/>
+              <a:t>: (0.5, 0.5)</a:t>
+            </a:r>
+          </a:p>
+          <a:p>
+            <a:r>
+              <a:rPr lang="ko-KR" altLang="en-US" sz="1400" dirty="0"/>
+              <a:t>색상</a:t>
+            </a:r>
+            <a:r>
+              <a:rPr lang="en-US" altLang="ko-KR" sz="1400" dirty="0"/>
+              <a:t>: (0.0, 0.0, 1.0, 1.0)</a:t>
+            </a:r>
+            <a:endParaRPr lang="ko-KR" altLang="en-US" sz="1400" dirty="0"/>
+          </a:p>
+        </p:txBody>
+      </p:sp>
+      <p:cxnSp>
+        <p:nvCxnSpPr>
+          <p:cNvPr id="12" name="연결선: 구부러짐 11">
+            <a:extLst>
+              <a:ext uri="{FF2B5EF4-FFF2-40B4-BE49-F238E27FC236}">
+                <a16:creationId xmlns:a16="http://schemas.microsoft.com/office/drawing/2014/main" id="{2944D970-D74E-4ADA-BCFA-3D7AB794CD3C}"/>
+              </a:ext>
+            </a:extLst>
+          </p:cNvPr>
+          <p:cNvCxnSpPr>
+            <a:stCxn id="5" idx="1"/>
+            <a:endCxn id="10" idx="2"/>
+          </p:cNvCxnSpPr>
+          <p:nvPr/>
+        </p:nvCxnSpPr>
+        <p:spPr>
+          <a:xfrm rot="16200000" flipV="1">
+            <a:off x="1305442" y="1266666"/>
+            <a:ext cx="331385" cy="172652"/>
+          </a:xfrm>
+          <a:prstGeom prst="curvedConnector3">
+            <a:avLst>
+              <a:gd name="adj1" fmla="val 50000"/>
+            </a:avLst>
+          </a:prstGeom>
+          <a:ln>
+            <a:solidFill>
+              <a:schemeClr val="tx1"/>
+            </a:solidFill>
+            <a:tailEnd type="triangle"/>
+          </a:ln>
+        </p:spPr>
+        <p:style>
+          <a:lnRef idx="1">
+            <a:schemeClr val="accent1"/>
+          </a:lnRef>
+          <a:fillRef idx="0">
+            <a:schemeClr val="accent1"/>
+          </a:fillRef>
+          <a:effectRef idx="0">
+            <a:schemeClr val="accent1"/>
+          </a:effectRef>
+          <a:fontRef idx="minor">
+            <a:schemeClr val="tx1"/>
+          </a:fontRef>
+        </p:style>
+      </p:cxnSp>
+      <p:cxnSp>
+        <p:nvCxnSpPr>
+          <p:cNvPr id="13" name="연결선: 구부러짐 12">
+            <a:extLst>
+              <a:ext uri="{FF2B5EF4-FFF2-40B4-BE49-F238E27FC236}">
+                <a16:creationId xmlns:a16="http://schemas.microsoft.com/office/drawing/2014/main" id="{AAAAF0FA-517A-4489-AAB9-43FC2EEDF3BA}"/>
+              </a:ext>
+            </a:extLst>
+          </p:cNvPr>
+          <p:cNvCxnSpPr>
+            <a:cxnSpLocks/>
+            <a:stCxn id="6" idx="7"/>
+            <a:endCxn id="11" idx="2"/>
+          </p:cNvCxnSpPr>
+          <p:nvPr/>
+        </p:nvCxnSpPr>
+        <p:spPr>
+          <a:xfrm rot="5400000" flipH="1" flipV="1">
+            <a:off x="3366751" y="935325"/>
+            <a:ext cx="331385" cy="835335"/>
+          </a:xfrm>
+          <a:prstGeom prst="curvedConnector3">
+            <a:avLst>
+              <a:gd name="adj1" fmla="val 50000"/>
+            </a:avLst>
+          </a:prstGeom>
+          <a:ln>
+            <a:solidFill>
+              <a:schemeClr val="tx1"/>
+            </a:solidFill>
+            <a:tailEnd type="triangle"/>
+          </a:ln>
+        </p:spPr>
+        <p:style>
+          <a:lnRef idx="1">
+            <a:schemeClr val="accent1"/>
+          </a:lnRef>
+          <a:fillRef idx="0">
+            <a:schemeClr val="accent1"/>
+          </a:fillRef>
+          <a:effectRef idx="0">
+            <a:schemeClr val="accent1"/>
+          </a:effectRef>
+          <a:fontRef idx="minor">
+            <a:schemeClr val="tx1"/>
+          </a:fontRef>
+        </p:style>
+      </p:cxnSp>
+      <p:cxnSp>
+        <p:nvCxnSpPr>
+          <p:cNvPr id="14" name="연결선: 구부러짐 13">
+            <a:extLst>
+              <a:ext uri="{FF2B5EF4-FFF2-40B4-BE49-F238E27FC236}">
+                <a16:creationId xmlns:a16="http://schemas.microsoft.com/office/drawing/2014/main" id="{23C63DFC-C1F0-457A-9752-FD6E4AA7B5D5}"/>
+              </a:ext>
+            </a:extLst>
+          </p:cNvPr>
+          <p:cNvCxnSpPr>
+            <a:cxnSpLocks/>
+            <a:stCxn id="4" idx="4"/>
+            <a:endCxn id="8" idx="0"/>
+          </p:cNvCxnSpPr>
+          <p:nvPr/>
+        </p:nvCxnSpPr>
+        <p:spPr>
+          <a:xfrm rot="5400000">
+            <a:off x="1408481" y="2876267"/>
+            <a:ext cx="159728" cy="207074"/>
+          </a:xfrm>
+          <a:prstGeom prst="curvedConnector3">
+            <a:avLst>
+              <a:gd name="adj1" fmla="val 50000"/>
+            </a:avLst>
+          </a:prstGeom>
+          <a:ln>
+            <a:solidFill>
+              <a:schemeClr val="tx1"/>
+            </a:solidFill>
+            <a:tailEnd type="triangle"/>
+          </a:ln>
+        </p:spPr>
+        <p:style>
+          <a:lnRef idx="1">
+            <a:schemeClr val="accent1"/>
+          </a:lnRef>
+          <a:fillRef idx="0">
+            <a:schemeClr val="accent1"/>
+          </a:fillRef>
+          <a:effectRef idx="0">
+            <a:schemeClr val="accent1"/>
+          </a:effectRef>
+          <a:fontRef idx="minor">
+            <a:schemeClr val="tx1"/>
+          </a:fontRef>
+        </p:style>
+      </p:cxnSp>
+      <p:cxnSp>
+        <p:nvCxnSpPr>
+          <p:cNvPr id="15" name="연결선: 구부러짐 14">
+            <a:extLst>
+              <a:ext uri="{FF2B5EF4-FFF2-40B4-BE49-F238E27FC236}">
+                <a16:creationId xmlns:a16="http://schemas.microsoft.com/office/drawing/2014/main" id="{B6031116-956A-45CF-932F-4251FE01D713}"/>
+              </a:ext>
+            </a:extLst>
+          </p:cNvPr>
+          <p:cNvCxnSpPr>
+            <a:cxnSpLocks/>
+            <a:stCxn id="7" idx="5"/>
+            <a:endCxn id="9" idx="0"/>
+          </p:cNvCxnSpPr>
+          <p:nvPr/>
+        </p:nvCxnSpPr>
+        <p:spPr>
+          <a:xfrm rot="16200000" flipH="1">
+            <a:off x="3470524" y="2523976"/>
+            <a:ext cx="179942" cy="891441"/>
+          </a:xfrm>
+          <a:prstGeom prst="curvedConnector3">
+            <a:avLst>
+              <a:gd name="adj1" fmla="val 50000"/>
+            </a:avLst>
+          </a:prstGeom>
+          <a:ln>
+            <a:solidFill>
+              <a:schemeClr val="tx1"/>
+            </a:solidFill>
+            <a:tailEnd type="triangle"/>
+          </a:ln>
+        </p:spPr>
+        <p:style>
+          <a:lnRef idx="1">
+            <a:schemeClr val="accent1"/>
+          </a:lnRef>
+          <a:fillRef idx="0">
+            <a:schemeClr val="accent1"/>
+          </a:fillRef>
+          <a:effectRef idx="0">
+            <a:schemeClr val="accent1"/>
+          </a:effectRef>
+          <a:fontRef idx="minor">
+            <a:schemeClr val="tx1"/>
+          </a:fontRef>
+        </p:style>
+      </p:cxnSp>
+      <p:pic>
+        <p:nvPicPr>
+          <p:cNvPr id="16" name="그림 15">
+            <a:extLst>
+              <a:ext uri="{FF2B5EF4-FFF2-40B4-BE49-F238E27FC236}">
+                <a16:creationId xmlns:a16="http://schemas.microsoft.com/office/drawing/2014/main" id="{1DE7A65C-31FB-496D-9F9F-90ED8401258A}"/>
+              </a:ext>
+            </a:extLst>
+          </p:cNvPr>
+          <p:cNvPicPr>
+            <a:picLocks noChangeAspect="1"/>
+          </p:cNvPicPr>
+          <p:nvPr/>
+        </p:nvPicPr>
+        <p:blipFill>
+          <a:blip r:embed="rId2"/>
+          <a:stretch>
+            <a:fillRect/>
+          </a:stretch>
+        </p:blipFill>
+        <p:spPr>
+          <a:xfrm>
+            <a:off x="5856912" y="448635"/>
+            <a:ext cx="4657748" cy="3426249"/>
+          </a:xfrm>
+          <a:prstGeom prst="rect">
+            <a:avLst/>
+          </a:prstGeom>
+        </p:spPr>
+      </p:pic>
+    </p:spTree>
+    <p:extLst>
+      <p:ext uri="{BB962C8B-B14F-4D97-AF65-F5344CB8AC3E}">
+        <p14:creationId xmlns:p14="http://schemas.microsoft.com/office/powerpoint/2010/main" val="418001676"/>
+      </p:ext>
+    </p:extLst>
+  </p:cSld>
+  <p:clrMapOvr>
+    <a:masterClrMapping/>
+  </p:clrMapOvr>
+</p:sld>
+</file>
+
+<file path=ppt/slides/slide6.xml><?xml version="1.0" encoding="utf-8"?>
+<p:sld xmlns:a="http://schemas.openxmlformats.org/drawingml/2006/main" xmlns:r="http://schemas.openxmlformats.org/officeDocument/2006/relationships" xmlns:p="http://schemas.openxmlformats.org/presentationml/2006/main">
+  <p:cSld>
+    <p:spTree>
+      <p:nvGrpSpPr>
+        <p:cNvPr id="1" name=""/>
+        <p:cNvGrpSpPr/>
+        <p:nvPr/>
+      </p:nvGrpSpPr>
+      <p:grpSpPr>
+        <a:xfrm>
+          <a:off x="0" y="0"/>
+          <a:ext cx="0" cy="0"/>
+          <a:chOff x="0" y="0"/>
+          <a:chExt cx="0" cy="0"/>
+        </a:xfrm>
+      </p:grpSpPr>
+      <p:graphicFrame>
+        <p:nvGraphicFramePr>
+          <p:cNvPr id="34" name="표 33">
+            <a:extLst>
+              <a:ext uri="{FF2B5EF4-FFF2-40B4-BE49-F238E27FC236}">
+                <a16:creationId xmlns:a16="http://schemas.microsoft.com/office/drawing/2014/main" id="{BD306A86-800D-4C91-B78C-1F8E0110E498}"/>
+              </a:ext>
+            </a:extLst>
+          </p:cNvPr>
+          <p:cNvGraphicFramePr>
+            <a:graphicFrameLocks noGrp="1"/>
+          </p:cNvGraphicFramePr>
+          <p:nvPr>
+            <p:extLst>
+              <p:ext uri="{D42A27DB-BD31-4B8C-83A1-F6EECF244321}">
+                <p14:modId xmlns:p14="http://schemas.microsoft.com/office/powerpoint/2010/main" val="413258027"/>
+              </p:ext>
+            </p:extLst>
+          </p:nvPr>
+        </p:nvGraphicFramePr>
+        <p:xfrm>
+          <a:off x="450538" y="2199482"/>
+          <a:ext cx="8640000" cy="540000"/>
+        </p:xfrm>
+        <a:graphic>
+          <a:graphicData uri="http://schemas.openxmlformats.org/drawingml/2006/table">
+            <a:tbl>
+              <a:tblPr firstRow="1" bandRow="1">
+                <a:tableStyleId>{5940675A-B579-460E-94D1-54222C63F5DA}</a:tableStyleId>
+              </a:tblPr>
+              <a:tblGrid>
+                <a:gridCol w="540000">
+                  <a:extLst>
+                    <a:ext uri="{9D8B030D-6E8A-4147-A177-3AD203B41FA5}">
+                      <a16:colId xmlns:a16="http://schemas.microsoft.com/office/drawing/2014/main" val="2824228910"/>
+                    </a:ext>
+                  </a:extLst>
+                </a:gridCol>
+                <a:gridCol w="540000">
+                  <a:extLst>
+                    <a:ext uri="{9D8B030D-6E8A-4147-A177-3AD203B41FA5}">
+                      <a16:colId xmlns:a16="http://schemas.microsoft.com/office/drawing/2014/main" val="4005111096"/>
+                    </a:ext>
+                  </a:extLst>
+                </a:gridCol>
+                <a:gridCol w="540000">
+                  <a:extLst>
+                    <a:ext uri="{9D8B030D-6E8A-4147-A177-3AD203B41FA5}">
+                      <a16:colId xmlns:a16="http://schemas.microsoft.com/office/drawing/2014/main" val="1148602740"/>
+                    </a:ext>
+                  </a:extLst>
+                </a:gridCol>
+                <a:gridCol w="540000">
+                  <a:extLst>
+                    <a:ext uri="{9D8B030D-6E8A-4147-A177-3AD203B41FA5}">
+                      <a16:colId xmlns:a16="http://schemas.microsoft.com/office/drawing/2014/main" val="431688392"/>
+                    </a:ext>
+                  </a:extLst>
+                </a:gridCol>
+                <a:gridCol w="540000">
+                  <a:extLst>
+                    <a:ext uri="{9D8B030D-6E8A-4147-A177-3AD203B41FA5}">
+                      <a16:colId xmlns:a16="http://schemas.microsoft.com/office/drawing/2014/main" val="2759238495"/>
+                    </a:ext>
+                  </a:extLst>
+                </a:gridCol>
+                <a:gridCol w="540000">
+                  <a:extLst>
+                    <a:ext uri="{9D8B030D-6E8A-4147-A177-3AD203B41FA5}">
+                      <a16:colId xmlns:a16="http://schemas.microsoft.com/office/drawing/2014/main" val="4210630380"/>
+                    </a:ext>
+                  </a:extLst>
+                </a:gridCol>
+                <a:gridCol w="540000">
+                  <a:extLst>
+                    <a:ext uri="{9D8B030D-6E8A-4147-A177-3AD203B41FA5}">
+                      <a16:colId xmlns:a16="http://schemas.microsoft.com/office/drawing/2014/main" val="2387660287"/>
+                    </a:ext>
+                  </a:extLst>
+                </a:gridCol>
+                <a:gridCol w="540000">
+                  <a:extLst>
+                    <a:ext uri="{9D8B030D-6E8A-4147-A177-3AD203B41FA5}">
+                      <a16:colId xmlns:a16="http://schemas.microsoft.com/office/drawing/2014/main" val="2246506223"/>
+                    </a:ext>
+                  </a:extLst>
+                </a:gridCol>
+                <a:gridCol w="540000">
+                  <a:extLst>
+                    <a:ext uri="{9D8B030D-6E8A-4147-A177-3AD203B41FA5}">
+                      <a16:colId xmlns:a16="http://schemas.microsoft.com/office/drawing/2014/main" val="3043602203"/>
+                    </a:ext>
+                  </a:extLst>
+                </a:gridCol>
+                <a:gridCol w="540000">
+                  <a:extLst>
+                    <a:ext uri="{9D8B030D-6E8A-4147-A177-3AD203B41FA5}">
+                      <a16:colId xmlns:a16="http://schemas.microsoft.com/office/drawing/2014/main" val="4168829871"/>
+                    </a:ext>
+                  </a:extLst>
+                </a:gridCol>
+                <a:gridCol w="540000">
+                  <a:extLst>
+                    <a:ext uri="{9D8B030D-6E8A-4147-A177-3AD203B41FA5}">
+                      <a16:colId xmlns:a16="http://schemas.microsoft.com/office/drawing/2014/main" val="1189917962"/>
+                    </a:ext>
+                  </a:extLst>
+                </a:gridCol>
+                <a:gridCol w="540000">
+                  <a:extLst>
+                    <a:ext uri="{9D8B030D-6E8A-4147-A177-3AD203B41FA5}">
+                      <a16:colId xmlns:a16="http://schemas.microsoft.com/office/drawing/2014/main" val="2148006373"/>
+                    </a:ext>
+                  </a:extLst>
+                </a:gridCol>
+                <a:gridCol w="540000">
+                  <a:extLst>
+                    <a:ext uri="{9D8B030D-6E8A-4147-A177-3AD203B41FA5}">
+                      <a16:colId xmlns:a16="http://schemas.microsoft.com/office/drawing/2014/main" val="909182628"/>
+                    </a:ext>
+                  </a:extLst>
+                </a:gridCol>
+                <a:gridCol w="540000">
+                  <a:extLst>
+                    <a:ext uri="{9D8B030D-6E8A-4147-A177-3AD203B41FA5}">
+                      <a16:colId xmlns:a16="http://schemas.microsoft.com/office/drawing/2014/main" val="3334884809"/>
+                    </a:ext>
+                  </a:extLst>
+                </a:gridCol>
+                <a:gridCol w="540000">
+                  <a:extLst>
+                    <a:ext uri="{9D8B030D-6E8A-4147-A177-3AD203B41FA5}">
+                      <a16:colId xmlns:a16="http://schemas.microsoft.com/office/drawing/2014/main" val="550965801"/>
+                    </a:ext>
+                  </a:extLst>
+                </a:gridCol>
+                <a:gridCol w="540000">
+                  <a:extLst>
+                    <a:ext uri="{9D8B030D-6E8A-4147-A177-3AD203B41FA5}">
+                      <a16:colId xmlns:a16="http://schemas.microsoft.com/office/drawing/2014/main" val="2135256332"/>
+                    </a:ext>
+                  </a:extLst>
+                </a:gridCol>
+              </a:tblGrid>
+              <a:tr h="540000">
+                <a:tc>
+                  <a:txBody>
+                    <a:bodyPr/>
+                    <a:lstStyle/>
+                    <a:p>
+                      <a:pPr algn="ctr" latinLnBrk="1"/>
+                      <a:r>
+                        <a:rPr lang="en-US" altLang="ko-KR" sz="1600" dirty="0"/>
+                        <a:t>-0.5</a:t>
+                      </a:r>
+                      <a:endParaRPr lang="ko-KR" altLang="en-US" sz="1600" dirty="0"/>
+                    </a:p>
+                  </a:txBody>
+                  <a:tcPr anchor="ctr"/>
+                </a:tc>
+                <a:tc>
+                  <a:txBody>
+                    <a:bodyPr/>
+                    <a:lstStyle/>
+                    <a:p>
+                      <a:pPr algn="ctr" latinLnBrk="1"/>
+                      <a:r>
+                        <a:rPr lang="en-US" altLang="ko-KR" sz="1600" dirty="0"/>
+                        <a:t>-0.5</a:t>
+                      </a:r>
+                      <a:endParaRPr lang="ko-KR" altLang="en-US" sz="1600" dirty="0"/>
+                    </a:p>
+                  </a:txBody>
+                  <a:tcPr anchor="ctr"/>
+                </a:tc>
+                <a:tc>
+                  <a:txBody>
+                    <a:bodyPr/>
+                    <a:lstStyle/>
+                    <a:p>
+                      <a:pPr algn="ctr" latinLnBrk="1"/>
+                      <a:r>
+                        <a:rPr lang="en-US" altLang="ko-KR" sz="1600" dirty="0"/>
+                        <a:t>1.0</a:t>
+                      </a:r>
+                      <a:endParaRPr lang="ko-KR" altLang="en-US" sz="1600" dirty="0"/>
+                    </a:p>
+                  </a:txBody>
+                  <a:tcPr anchor="ctr"/>
+                </a:tc>
+                <a:tc>
+                  <a:txBody>
+                    <a:bodyPr/>
+                    <a:lstStyle/>
+                    <a:p>
+                      <a:pPr algn="ctr" latinLnBrk="1"/>
+                      <a:r>
+                        <a:rPr lang="en-US" altLang="ko-KR" sz="1600" dirty="0"/>
+                        <a:t>0.0</a:t>
+                      </a:r>
+                      <a:endParaRPr lang="ko-KR" altLang="en-US" sz="1600" dirty="0"/>
+                    </a:p>
+                  </a:txBody>
+                  <a:tcPr anchor="ctr"/>
+                </a:tc>
+                <a:tc>
+                  <a:txBody>
+                    <a:bodyPr/>
+                    <a:lstStyle/>
+                    <a:p>
+                      <a:pPr algn="ctr" latinLnBrk="1"/>
+                      <a:r>
+                        <a:rPr lang="en-US" altLang="ko-KR" sz="1600" dirty="0"/>
+                        <a:t>0.0</a:t>
+                      </a:r>
+                      <a:endParaRPr lang="ko-KR" altLang="en-US" sz="1600" dirty="0"/>
+                    </a:p>
+                  </a:txBody>
+                  <a:tcPr anchor="ctr"/>
+                </a:tc>
+                <a:tc>
+                  <a:txBody>
+                    <a:bodyPr/>
+                    <a:lstStyle/>
+                    <a:p>
+                      <a:pPr algn="ctr" latinLnBrk="1"/>
+                      <a:r>
+                        <a:rPr lang="en-US" altLang="ko-KR" sz="1600" dirty="0"/>
+                        <a:t>1.0</a:t>
+                      </a:r>
+                      <a:endParaRPr lang="ko-KR" altLang="en-US" sz="1600" dirty="0"/>
+                    </a:p>
+                  </a:txBody>
+                  <a:tcPr anchor="ctr"/>
+                </a:tc>
+                <a:tc>
+                  <a:txBody>
+                    <a:bodyPr/>
+                    <a:lstStyle/>
+                    <a:p>
+                      <a:pPr algn="ctr" latinLnBrk="1"/>
+                      <a:r>
+                        <a:rPr lang="en-US" altLang="ko-KR" sz="1600" dirty="0"/>
+                        <a:t>0.5</a:t>
+                      </a:r>
+                      <a:endParaRPr lang="ko-KR" altLang="en-US" sz="1600" dirty="0"/>
+                    </a:p>
+                  </a:txBody>
+                  <a:tcPr anchor="ctr"/>
+                </a:tc>
+                <a:tc>
+                  <a:txBody>
+                    <a:bodyPr/>
+                    <a:lstStyle/>
+                    <a:p>
+                      <a:pPr algn="ctr" latinLnBrk="1"/>
+                      <a:r>
+                        <a:rPr lang="en-US" altLang="ko-KR" sz="1600" dirty="0"/>
+                        <a:t>-0.5</a:t>
+                      </a:r>
+                      <a:endParaRPr lang="ko-KR" altLang="en-US" sz="1600" dirty="0"/>
+                    </a:p>
+                  </a:txBody>
+                  <a:tcPr anchor="ctr"/>
+                </a:tc>
+                <a:tc>
+                  <a:txBody>
+                    <a:bodyPr/>
+                    <a:lstStyle/>
+                    <a:p>
+                      <a:pPr algn="ctr" latinLnBrk="1"/>
+                      <a:r>
+                        <a:rPr lang="en-US" altLang="ko-KR" sz="1600" dirty="0"/>
+                        <a:t>0.0</a:t>
+                      </a:r>
+                      <a:endParaRPr lang="ko-KR" altLang="en-US" sz="1600" dirty="0"/>
+                    </a:p>
+                  </a:txBody>
+                  <a:tcPr anchor="ctr"/>
+                </a:tc>
+                <a:tc>
+                  <a:txBody>
+                    <a:bodyPr/>
+                    <a:lstStyle/>
+                    <a:p>
+                      <a:pPr algn="ctr" latinLnBrk="1"/>
+                      <a:r>
+                        <a:rPr lang="en-US" altLang="ko-KR" sz="1600" dirty="0"/>
+                        <a:t>1.0</a:t>
+                      </a:r>
+                      <a:endParaRPr lang="ko-KR" altLang="en-US" sz="1600" dirty="0"/>
+                    </a:p>
+                  </a:txBody>
+                  <a:tcPr anchor="ctr"/>
+                </a:tc>
+                <a:tc>
+                  <a:txBody>
+                    <a:bodyPr/>
+                    <a:lstStyle/>
+                    <a:p>
+                      <a:pPr algn="ctr" latinLnBrk="1"/>
+                      <a:r>
+                        <a:rPr lang="en-US" altLang="ko-KR" sz="1600" dirty="0"/>
+                        <a:t>0.0</a:t>
+                      </a:r>
+                      <a:endParaRPr lang="ko-KR" altLang="en-US" sz="1600" dirty="0"/>
+                    </a:p>
+                  </a:txBody>
+                  <a:tcPr anchor="ctr"/>
+                </a:tc>
+                <a:tc>
+                  <a:txBody>
+                    <a:bodyPr/>
+                    <a:lstStyle/>
+                    <a:p>
+                      <a:pPr algn="ctr" latinLnBrk="1"/>
+                      <a:r>
+                        <a:rPr lang="en-US" altLang="ko-KR" sz="1600" dirty="0"/>
+                        <a:t>1.0</a:t>
+                      </a:r>
+                      <a:endParaRPr lang="ko-KR" altLang="en-US" sz="1600" dirty="0"/>
+                    </a:p>
+                  </a:txBody>
+                  <a:tcPr anchor="ctr"/>
+                </a:tc>
+                <a:tc>
+                  <a:txBody>
+                    <a:bodyPr/>
+                    <a:lstStyle/>
+                    <a:p>
+                      <a:pPr algn="ctr" latinLnBrk="1"/>
+                      <a:r>
+                        <a:rPr lang="en-US" altLang="ko-KR" sz="1600" dirty="0"/>
+                        <a:t>0.5</a:t>
+                      </a:r>
+                      <a:endParaRPr lang="ko-KR" altLang="en-US" sz="1600" dirty="0"/>
+                    </a:p>
+                  </a:txBody>
+                  <a:tcPr anchor="ctr"/>
+                </a:tc>
+                <a:tc>
+                  <a:txBody>
+                    <a:bodyPr/>
+                    <a:lstStyle/>
+                    <a:p>
+                      <a:pPr algn="ctr" latinLnBrk="1"/>
+                      <a:r>
+                        <a:rPr lang="en-US" altLang="ko-KR" sz="1600" dirty="0"/>
+                        <a:t>0.5</a:t>
+                      </a:r>
+                      <a:endParaRPr lang="ko-KR" altLang="en-US" sz="1600" dirty="0"/>
+                    </a:p>
+                  </a:txBody>
+                  <a:tcPr anchor="ctr"/>
+                </a:tc>
+                <a:tc>
+                  <a:txBody>
+                    <a:bodyPr/>
+                    <a:lstStyle/>
+                    <a:p>
+                      <a:pPr algn="ctr" latinLnBrk="1"/>
+                      <a:r>
+                        <a:rPr lang="en-US" altLang="ko-KR" sz="1600" dirty="0"/>
+                        <a:t>0.0</a:t>
+                      </a:r>
+                      <a:endParaRPr lang="ko-KR" altLang="en-US" sz="1600" dirty="0"/>
+                    </a:p>
+                  </a:txBody>
+                  <a:tcPr anchor="ctr"/>
+                </a:tc>
+                <a:tc>
+                  <a:txBody>
+                    <a:bodyPr/>
+                    <a:lstStyle/>
+                    <a:p>
+                      <a:pPr algn="ctr" latinLnBrk="1"/>
+                      <a:r>
+                        <a:rPr lang="en-US" altLang="ko-KR" sz="1600" dirty="0"/>
+                        <a:t>…</a:t>
+                      </a:r>
+                      <a:endParaRPr lang="ko-KR" altLang="en-US" sz="1600" dirty="0"/>
+                    </a:p>
+                  </a:txBody>
+                  <a:tcPr anchor="ctr"/>
+                </a:tc>
+                <a:extLst>
+                  <a:ext uri="{0D108BD9-81ED-4DB2-BD59-A6C34878D82A}">
+                    <a16:rowId xmlns:a16="http://schemas.microsoft.com/office/drawing/2014/main" val="181435893"/>
+                  </a:ext>
+                </a:extLst>
+              </a:tr>
+            </a:tbl>
+          </a:graphicData>
+        </a:graphic>
+      </p:graphicFrame>
+      <p:cxnSp>
+        <p:nvCxnSpPr>
+          <p:cNvPr id="35" name="직선 화살표 연결선 34">
+            <a:extLst>
+              <a:ext uri="{FF2B5EF4-FFF2-40B4-BE49-F238E27FC236}">
+                <a16:creationId xmlns:a16="http://schemas.microsoft.com/office/drawing/2014/main" id="{CF919E72-36D0-4BAD-A4FC-BD537A259365}"/>
+              </a:ext>
+            </a:extLst>
+          </p:cNvPr>
+          <p:cNvCxnSpPr/>
+          <p:nvPr/>
+        </p:nvCxnSpPr>
+        <p:spPr>
+          <a:xfrm>
+            <a:off x="450538" y="3771300"/>
+            <a:ext cx="3210691" cy="0"/>
+          </a:xfrm>
+          <a:prstGeom prst="straightConnector1">
+            <a:avLst/>
+          </a:prstGeom>
+          <a:ln>
+            <a:solidFill>
+              <a:srgbClr val="FF0000"/>
+            </a:solidFill>
+            <a:headEnd type="triangle"/>
+            <a:tailEnd type="triangle"/>
+          </a:ln>
+        </p:spPr>
+        <p:style>
+          <a:lnRef idx="1">
+            <a:schemeClr val="accent1"/>
+          </a:lnRef>
+          <a:fillRef idx="0">
+            <a:schemeClr val="accent1"/>
+          </a:fillRef>
+          <a:effectRef idx="0">
+            <a:schemeClr val="accent1"/>
+          </a:effectRef>
+          <a:fontRef idx="minor">
+            <a:schemeClr val="tx1"/>
+          </a:fontRef>
+        </p:style>
+      </p:cxnSp>
+      <p:cxnSp>
+        <p:nvCxnSpPr>
+          <p:cNvPr id="36" name="직선 화살표 연결선 35">
+            <a:extLst>
+              <a:ext uri="{FF2B5EF4-FFF2-40B4-BE49-F238E27FC236}">
+                <a16:creationId xmlns:a16="http://schemas.microsoft.com/office/drawing/2014/main" id="{FF12585A-DD72-453B-AE24-1E04F0E62794}"/>
+              </a:ext>
+            </a:extLst>
+          </p:cNvPr>
+          <p:cNvCxnSpPr/>
+          <p:nvPr/>
+        </p:nvCxnSpPr>
+        <p:spPr>
+          <a:xfrm>
+            <a:off x="3723187" y="3771300"/>
+            <a:ext cx="3210691" cy="0"/>
+          </a:xfrm>
+          <a:prstGeom prst="straightConnector1">
+            <a:avLst/>
+          </a:prstGeom>
+          <a:ln>
+            <a:solidFill>
+              <a:srgbClr val="00FF00"/>
+            </a:solidFill>
+            <a:headEnd type="triangle"/>
+            <a:tailEnd type="triangle"/>
+          </a:ln>
+        </p:spPr>
+        <p:style>
+          <a:lnRef idx="1">
+            <a:schemeClr val="accent1"/>
+          </a:lnRef>
+          <a:fillRef idx="0">
+            <a:schemeClr val="accent1"/>
+          </a:fillRef>
+          <a:effectRef idx="0">
+            <a:schemeClr val="accent1"/>
+          </a:effectRef>
+          <a:fontRef idx="minor">
+            <a:schemeClr val="tx1"/>
+          </a:fontRef>
+        </p:style>
+      </p:cxnSp>
+      <p:cxnSp>
+        <p:nvCxnSpPr>
+          <p:cNvPr id="37" name="직선 화살표 연결선 36">
+            <a:extLst>
+              <a:ext uri="{FF2B5EF4-FFF2-40B4-BE49-F238E27FC236}">
+                <a16:creationId xmlns:a16="http://schemas.microsoft.com/office/drawing/2014/main" id="{045BF58C-B29B-44FD-963E-85C884FFD79B}"/>
+              </a:ext>
+            </a:extLst>
+          </p:cNvPr>
+          <p:cNvCxnSpPr>
+            <a:cxnSpLocks/>
+          </p:cNvCxnSpPr>
+          <p:nvPr/>
+        </p:nvCxnSpPr>
+        <p:spPr>
+          <a:xfrm>
+            <a:off x="6971978" y="3771300"/>
+            <a:ext cx="2118560" cy="0"/>
+          </a:xfrm>
+          <a:prstGeom prst="straightConnector1">
+            <a:avLst/>
+          </a:prstGeom>
+          <a:ln>
+            <a:solidFill>
+              <a:srgbClr val="0000FF"/>
+            </a:solidFill>
+            <a:headEnd type="triangle"/>
+            <a:tailEnd type="triangle"/>
+          </a:ln>
+        </p:spPr>
+        <p:style>
+          <a:lnRef idx="1">
+            <a:schemeClr val="accent1"/>
+          </a:lnRef>
+          <a:fillRef idx="0">
+            <a:schemeClr val="accent1"/>
+          </a:fillRef>
+          <a:effectRef idx="0">
+            <a:schemeClr val="accent1"/>
+          </a:effectRef>
+          <a:fontRef idx="minor">
+            <a:schemeClr val="tx1"/>
+          </a:fontRef>
+        </p:style>
+      </p:cxnSp>
+      <p:sp>
+        <p:nvSpPr>
+          <p:cNvPr id="38" name="직사각형 37">
+            <a:extLst>
+              <a:ext uri="{FF2B5EF4-FFF2-40B4-BE49-F238E27FC236}">
+                <a16:creationId xmlns:a16="http://schemas.microsoft.com/office/drawing/2014/main" id="{D07F3B64-60D3-4B84-B1D7-F1B3E33FA092}"/>
+              </a:ext>
+            </a:extLst>
+          </p:cNvPr>
+          <p:cNvSpPr/>
+          <p:nvPr/>
+        </p:nvSpPr>
+        <p:spPr>
+          <a:xfrm>
+            <a:off x="1415965" y="3858862"/>
+            <a:ext cx="1258678" cy="369332"/>
+          </a:xfrm>
+          <a:prstGeom prst="rect">
+            <a:avLst/>
+          </a:prstGeom>
+        </p:spPr>
+        <p:txBody>
+          <a:bodyPr wrap="none">
+            <a:spAutoFit/>
+          </a:bodyPr>
+          <a:lstStyle/>
+          <a:p>
+            <a:r>
+              <a:rPr lang="en-US" altLang="ko-KR" b="1" dirty="0"/>
+              <a:t>[0</a:t>
+            </a:r>
+            <a:r>
+              <a:rPr lang="ko-KR" altLang="en-US" b="1" dirty="0"/>
+              <a:t>번 정점</a:t>
+            </a:r>
+            <a:r>
+              <a:rPr lang="en-US" altLang="ko-KR" b="1" dirty="0"/>
+              <a:t>]</a:t>
+            </a:r>
+          </a:p>
+        </p:txBody>
+      </p:sp>
+      <p:sp>
+        <p:nvSpPr>
+          <p:cNvPr id="39" name="직사각형 38">
+            <a:extLst>
+              <a:ext uri="{FF2B5EF4-FFF2-40B4-BE49-F238E27FC236}">
+                <a16:creationId xmlns:a16="http://schemas.microsoft.com/office/drawing/2014/main" id="{0C9037AE-B57B-477A-A719-E732EC29BAF2}"/>
+              </a:ext>
+            </a:extLst>
+          </p:cNvPr>
+          <p:cNvSpPr/>
+          <p:nvPr/>
+        </p:nvSpPr>
+        <p:spPr>
+          <a:xfrm>
+            <a:off x="4770538" y="3858862"/>
+            <a:ext cx="1258678" cy="369332"/>
+          </a:xfrm>
+          <a:prstGeom prst="rect">
+            <a:avLst/>
+          </a:prstGeom>
+        </p:spPr>
+        <p:txBody>
+          <a:bodyPr wrap="none">
+            <a:spAutoFit/>
+          </a:bodyPr>
+          <a:lstStyle/>
+          <a:p>
+            <a:r>
+              <a:rPr lang="en-US" altLang="ko-KR" b="1" dirty="0"/>
+              <a:t>[1</a:t>
+            </a:r>
+            <a:r>
+              <a:rPr lang="ko-KR" altLang="en-US" b="1" dirty="0"/>
+              <a:t>번 정점</a:t>
+            </a:r>
+            <a:r>
+              <a:rPr lang="en-US" altLang="ko-KR" b="1" dirty="0"/>
+              <a:t>]</a:t>
+            </a:r>
+          </a:p>
+        </p:txBody>
+      </p:sp>
+      <p:sp>
+        <p:nvSpPr>
+          <p:cNvPr id="40" name="직사각형 39">
+            <a:extLst>
+              <a:ext uri="{FF2B5EF4-FFF2-40B4-BE49-F238E27FC236}">
+                <a16:creationId xmlns:a16="http://schemas.microsoft.com/office/drawing/2014/main" id="{EA6763C0-900A-4C00-9115-CAE5829B71EE}"/>
+              </a:ext>
+            </a:extLst>
+          </p:cNvPr>
+          <p:cNvSpPr/>
+          <p:nvPr/>
+        </p:nvSpPr>
+        <p:spPr>
+          <a:xfrm>
+            <a:off x="7401919" y="3907441"/>
+            <a:ext cx="1258678" cy="369332"/>
+          </a:xfrm>
+          <a:prstGeom prst="rect">
+            <a:avLst/>
+          </a:prstGeom>
+        </p:spPr>
+        <p:txBody>
+          <a:bodyPr wrap="none">
+            <a:spAutoFit/>
+          </a:bodyPr>
+          <a:lstStyle/>
+          <a:p>
+            <a:r>
+              <a:rPr lang="en-US" altLang="ko-KR" b="1" dirty="0"/>
+              <a:t>[2</a:t>
+            </a:r>
+            <a:r>
+              <a:rPr lang="ko-KR" altLang="en-US" b="1" dirty="0"/>
+              <a:t>번 정점</a:t>
+            </a:r>
+            <a:r>
+              <a:rPr lang="en-US" altLang="ko-KR" b="1" dirty="0"/>
+              <a:t>]</a:t>
+            </a:r>
+          </a:p>
+        </p:txBody>
+      </p:sp>
+      <p:cxnSp>
+        <p:nvCxnSpPr>
+          <p:cNvPr id="41" name="직선 화살표 연결선 40">
+            <a:extLst>
+              <a:ext uri="{FF2B5EF4-FFF2-40B4-BE49-F238E27FC236}">
+                <a16:creationId xmlns:a16="http://schemas.microsoft.com/office/drawing/2014/main" id="{64B26C94-1FE0-4D31-8291-2585955FCA17}"/>
+              </a:ext>
+            </a:extLst>
+          </p:cNvPr>
+          <p:cNvCxnSpPr>
+            <a:cxnSpLocks/>
+          </p:cNvCxnSpPr>
+          <p:nvPr/>
+        </p:nvCxnSpPr>
+        <p:spPr>
+          <a:xfrm>
+            <a:off x="450538" y="4314873"/>
+            <a:ext cx="1077091" cy="0"/>
+          </a:xfrm>
+          <a:prstGeom prst="straightConnector1">
+            <a:avLst/>
+          </a:prstGeom>
+          <a:ln>
+            <a:solidFill>
+              <a:srgbClr val="FF0000"/>
+            </a:solidFill>
+            <a:headEnd type="triangle"/>
+            <a:tailEnd type="triangle"/>
+          </a:ln>
+        </p:spPr>
+        <p:style>
+          <a:lnRef idx="1">
+            <a:schemeClr val="accent1"/>
+          </a:lnRef>
+          <a:fillRef idx="0">
+            <a:schemeClr val="accent1"/>
+          </a:fillRef>
+          <a:effectRef idx="0">
+            <a:schemeClr val="accent1"/>
+          </a:effectRef>
+          <a:fontRef idx="minor">
+            <a:schemeClr val="tx1"/>
+          </a:fontRef>
+        </p:style>
+      </p:cxnSp>
+      <p:cxnSp>
+        <p:nvCxnSpPr>
+          <p:cNvPr id="42" name="직선 화살표 연결선 41">
+            <a:extLst>
+              <a:ext uri="{FF2B5EF4-FFF2-40B4-BE49-F238E27FC236}">
+                <a16:creationId xmlns:a16="http://schemas.microsoft.com/office/drawing/2014/main" id="{4F7611F8-80F1-4E1E-980E-AB3E655E6CA2}"/>
+              </a:ext>
+            </a:extLst>
+          </p:cNvPr>
+          <p:cNvCxnSpPr>
+            <a:cxnSpLocks/>
+          </p:cNvCxnSpPr>
+          <p:nvPr/>
+        </p:nvCxnSpPr>
+        <p:spPr>
+          <a:xfrm>
+            <a:off x="1554639" y="4314873"/>
+            <a:ext cx="2106590" cy="0"/>
+          </a:xfrm>
+          <a:prstGeom prst="straightConnector1">
+            <a:avLst/>
+          </a:prstGeom>
+          <a:ln>
+            <a:solidFill>
+              <a:srgbClr val="FF0000"/>
+            </a:solidFill>
+            <a:headEnd type="triangle"/>
+            <a:tailEnd type="triangle"/>
+          </a:ln>
+        </p:spPr>
+        <p:style>
+          <a:lnRef idx="1">
+            <a:schemeClr val="accent1"/>
+          </a:lnRef>
+          <a:fillRef idx="0">
+            <a:schemeClr val="accent1"/>
+          </a:fillRef>
+          <a:effectRef idx="0">
+            <a:schemeClr val="accent1"/>
+          </a:effectRef>
+          <a:fontRef idx="minor">
+            <a:schemeClr val="tx1"/>
+          </a:fontRef>
+        </p:style>
+      </p:cxnSp>
+      <p:sp>
+        <p:nvSpPr>
+          <p:cNvPr id="43" name="직사각형 42">
+            <a:extLst>
+              <a:ext uri="{FF2B5EF4-FFF2-40B4-BE49-F238E27FC236}">
+                <a16:creationId xmlns:a16="http://schemas.microsoft.com/office/drawing/2014/main" id="{4C8EF953-A8F1-453E-8081-512855C16A31}"/>
+              </a:ext>
+            </a:extLst>
+          </p:cNvPr>
+          <p:cNvSpPr/>
+          <p:nvPr/>
+        </p:nvSpPr>
+        <p:spPr>
+          <a:xfrm>
+            <a:off x="714999" y="4432746"/>
+            <a:ext cx="646331" cy="369332"/>
+          </a:xfrm>
+          <a:prstGeom prst="rect">
+            <a:avLst/>
+          </a:prstGeom>
+        </p:spPr>
+        <p:txBody>
+          <a:bodyPr wrap="none">
+            <a:spAutoFit/>
+          </a:bodyPr>
+          <a:lstStyle/>
+          <a:p>
+            <a:r>
+              <a:rPr lang="ko-KR" altLang="en-US" b="1"/>
+              <a:t>위치</a:t>
+            </a:r>
+            <a:endParaRPr lang="en-US" altLang="ko-KR" b="1" dirty="0"/>
+          </a:p>
+        </p:txBody>
+      </p:sp>
+      <p:sp>
+        <p:nvSpPr>
+          <p:cNvPr id="44" name="직사각형 43">
+            <a:extLst>
+              <a:ext uri="{FF2B5EF4-FFF2-40B4-BE49-F238E27FC236}">
+                <a16:creationId xmlns:a16="http://schemas.microsoft.com/office/drawing/2014/main" id="{C238D064-AD6D-40A8-8A7B-BF647FED3379}"/>
+              </a:ext>
+            </a:extLst>
+          </p:cNvPr>
+          <p:cNvSpPr/>
+          <p:nvPr/>
+        </p:nvSpPr>
+        <p:spPr>
+          <a:xfrm>
+            <a:off x="2351477" y="4432746"/>
+            <a:ext cx="646331" cy="369332"/>
+          </a:xfrm>
+          <a:prstGeom prst="rect">
+            <a:avLst/>
+          </a:prstGeom>
+        </p:spPr>
+        <p:txBody>
+          <a:bodyPr wrap="none">
+            <a:spAutoFit/>
+          </a:bodyPr>
+          <a:lstStyle/>
+          <a:p>
+            <a:r>
+              <a:rPr lang="ko-KR" altLang="en-US" b="1" dirty="0"/>
+              <a:t>색상</a:t>
+            </a:r>
+            <a:endParaRPr lang="en-US" altLang="ko-KR" b="1" dirty="0"/>
+          </a:p>
+        </p:txBody>
+      </p:sp>
+      <p:cxnSp>
+        <p:nvCxnSpPr>
+          <p:cNvPr id="45" name="직선 화살표 연결선 44">
+            <a:extLst>
+              <a:ext uri="{FF2B5EF4-FFF2-40B4-BE49-F238E27FC236}">
+                <a16:creationId xmlns:a16="http://schemas.microsoft.com/office/drawing/2014/main" id="{1900B299-2B2E-46F8-9194-94F5F5217189}"/>
+              </a:ext>
+            </a:extLst>
+          </p:cNvPr>
+          <p:cNvCxnSpPr>
+            <a:cxnSpLocks/>
+          </p:cNvCxnSpPr>
+          <p:nvPr/>
+        </p:nvCxnSpPr>
+        <p:spPr>
+          <a:xfrm>
+            <a:off x="3733173" y="4314873"/>
+            <a:ext cx="1077091" cy="0"/>
+          </a:xfrm>
+          <a:prstGeom prst="straightConnector1">
+            <a:avLst/>
+          </a:prstGeom>
+          <a:ln>
+            <a:solidFill>
+              <a:srgbClr val="00FF00"/>
+            </a:solidFill>
+            <a:headEnd type="triangle"/>
+            <a:tailEnd type="triangle"/>
+          </a:ln>
+        </p:spPr>
+        <p:style>
+          <a:lnRef idx="1">
+            <a:schemeClr val="accent1"/>
+          </a:lnRef>
+          <a:fillRef idx="0">
+            <a:schemeClr val="accent1"/>
+          </a:fillRef>
+          <a:effectRef idx="0">
+            <a:schemeClr val="accent1"/>
+          </a:effectRef>
+          <a:fontRef idx="minor">
+            <a:schemeClr val="tx1"/>
+          </a:fontRef>
+        </p:style>
+      </p:cxnSp>
+      <p:cxnSp>
+        <p:nvCxnSpPr>
+          <p:cNvPr id="46" name="직선 화살표 연결선 45">
+            <a:extLst>
+              <a:ext uri="{FF2B5EF4-FFF2-40B4-BE49-F238E27FC236}">
+                <a16:creationId xmlns:a16="http://schemas.microsoft.com/office/drawing/2014/main" id="{D98B7A5F-56A8-47FA-AFD7-EE6A345CEA1C}"/>
+              </a:ext>
+            </a:extLst>
+          </p:cNvPr>
+          <p:cNvCxnSpPr>
+            <a:cxnSpLocks/>
+          </p:cNvCxnSpPr>
+          <p:nvPr/>
+        </p:nvCxnSpPr>
+        <p:spPr>
+          <a:xfrm>
+            <a:off x="4837274" y="4314873"/>
+            <a:ext cx="2106590" cy="0"/>
+          </a:xfrm>
+          <a:prstGeom prst="straightConnector1">
+            <a:avLst/>
+          </a:prstGeom>
+          <a:ln>
+            <a:solidFill>
+              <a:srgbClr val="00FF00"/>
+            </a:solidFill>
+            <a:headEnd type="triangle"/>
+            <a:tailEnd type="triangle"/>
+          </a:ln>
+        </p:spPr>
+        <p:style>
+          <a:lnRef idx="1">
+            <a:schemeClr val="accent1"/>
+          </a:lnRef>
+          <a:fillRef idx="0">
+            <a:schemeClr val="accent1"/>
+          </a:fillRef>
+          <a:effectRef idx="0">
+            <a:schemeClr val="accent1"/>
+          </a:effectRef>
+          <a:fontRef idx="minor">
+            <a:schemeClr val="tx1"/>
+          </a:fontRef>
+        </p:style>
+      </p:cxnSp>
+      <p:sp>
+        <p:nvSpPr>
+          <p:cNvPr id="47" name="직사각형 46">
+            <a:extLst>
+              <a:ext uri="{FF2B5EF4-FFF2-40B4-BE49-F238E27FC236}">
+                <a16:creationId xmlns:a16="http://schemas.microsoft.com/office/drawing/2014/main" id="{11A4BEC0-2AFA-4DE5-AA20-F32A3525F312}"/>
+              </a:ext>
+            </a:extLst>
+          </p:cNvPr>
+          <p:cNvSpPr/>
+          <p:nvPr/>
+        </p:nvSpPr>
+        <p:spPr>
+          <a:xfrm>
+            <a:off x="3997634" y="4432746"/>
+            <a:ext cx="646331" cy="369332"/>
+          </a:xfrm>
+          <a:prstGeom prst="rect">
+            <a:avLst/>
+          </a:prstGeom>
+        </p:spPr>
+        <p:txBody>
+          <a:bodyPr wrap="none">
+            <a:spAutoFit/>
+          </a:bodyPr>
+          <a:lstStyle/>
+          <a:p>
+            <a:r>
+              <a:rPr lang="ko-KR" altLang="en-US" b="1"/>
+              <a:t>위치</a:t>
+            </a:r>
+            <a:endParaRPr lang="en-US" altLang="ko-KR" b="1" dirty="0"/>
+          </a:p>
+        </p:txBody>
+      </p:sp>
+      <p:sp>
+        <p:nvSpPr>
+          <p:cNvPr id="48" name="직사각형 47">
+            <a:extLst>
+              <a:ext uri="{FF2B5EF4-FFF2-40B4-BE49-F238E27FC236}">
+                <a16:creationId xmlns:a16="http://schemas.microsoft.com/office/drawing/2014/main" id="{F20C78D3-817B-4B3D-9285-DBFA5A9C197F}"/>
+              </a:ext>
+            </a:extLst>
+          </p:cNvPr>
+          <p:cNvSpPr/>
+          <p:nvPr/>
+        </p:nvSpPr>
+        <p:spPr>
+          <a:xfrm>
+            <a:off x="5634112" y="4432746"/>
+            <a:ext cx="646331" cy="369332"/>
+          </a:xfrm>
+          <a:prstGeom prst="rect">
+            <a:avLst/>
+          </a:prstGeom>
+        </p:spPr>
+        <p:txBody>
+          <a:bodyPr wrap="none">
+            <a:spAutoFit/>
+          </a:bodyPr>
+          <a:lstStyle/>
+          <a:p>
+            <a:r>
+              <a:rPr lang="ko-KR" altLang="en-US" b="1" dirty="0"/>
+              <a:t>색상</a:t>
+            </a:r>
+            <a:endParaRPr lang="en-US" altLang="ko-KR" b="1" dirty="0"/>
+          </a:p>
+        </p:txBody>
+      </p:sp>
+      <p:cxnSp>
+        <p:nvCxnSpPr>
+          <p:cNvPr id="49" name="직선 화살표 연결선 48">
+            <a:extLst>
+              <a:ext uri="{FF2B5EF4-FFF2-40B4-BE49-F238E27FC236}">
+                <a16:creationId xmlns:a16="http://schemas.microsoft.com/office/drawing/2014/main" id="{206881D3-F09B-4D33-83D1-056B0263F2E5}"/>
+              </a:ext>
+            </a:extLst>
+          </p:cNvPr>
+          <p:cNvCxnSpPr>
+            <a:cxnSpLocks/>
+          </p:cNvCxnSpPr>
+          <p:nvPr/>
+        </p:nvCxnSpPr>
+        <p:spPr>
+          <a:xfrm>
+            <a:off x="7015808" y="4314873"/>
+            <a:ext cx="1077091" cy="0"/>
+          </a:xfrm>
+          <a:prstGeom prst="straightConnector1">
+            <a:avLst/>
+          </a:prstGeom>
+          <a:ln>
+            <a:solidFill>
+              <a:srgbClr val="0000FF"/>
+            </a:solidFill>
+            <a:headEnd type="triangle"/>
+            <a:tailEnd type="triangle"/>
+          </a:ln>
+        </p:spPr>
+        <p:style>
+          <a:lnRef idx="1">
+            <a:schemeClr val="accent1"/>
+          </a:lnRef>
+          <a:fillRef idx="0">
+            <a:schemeClr val="accent1"/>
+          </a:fillRef>
+          <a:effectRef idx="0">
+            <a:schemeClr val="accent1"/>
+          </a:effectRef>
+          <a:fontRef idx="minor">
+            <a:schemeClr val="tx1"/>
+          </a:fontRef>
+        </p:style>
+      </p:cxnSp>
+      <p:cxnSp>
+        <p:nvCxnSpPr>
+          <p:cNvPr id="50" name="직선 화살표 연결선 49">
+            <a:extLst>
+              <a:ext uri="{FF2B5EF4-FFF2-40B4-BE49-F238E27FC236}">
+                <a16:creationId xmlns:a16="http://schemas.microsoft.com/office/drawing/2014/main" id="{33AE7462-D50D-4B12-99F2-8F155F6C1BDA}"/>
+              </a:ext>
+            </a:extLst>
+          </p:cNvPr>
+          <p:cNvCxnSpPr>
+            <a:cxnSpLocks/>
+          </p:cNvCxnSpPr>
+          <p:nvPr/>
+        </p:nvCxnSpPr>
+        <p:spPr>
+          <a:xfrm>
+            <a:off x="8119909" y="4314873"/>
+            <a:ext cx="970629" cy="0"/>
+          </a:xfrm>
+          <a:prstGeom prst="straightConnector1">
+            <a:avLst/>
+          </a:prstGeom>
+          <a:ln>
+            <a:solidFill>
+              <a:srgbClr val="0000FF"/>
+            </a:solidFill>
+            <a:headEnd type="triangle"/>
+            <a:tailEnd type="triangle"/>
+          </a:ln>
+        </p:spPr>
+        <p:style>
+          <a:lnRef idx="1">
+            <a:schemeClr val="accent1"/>
+          </a:lnRef>
+          <a:fillRef idx="0">
+            <a:schemeClr val="accent1"/>
+          </a:fillRef>
+          <a:effectRef idx="0">
+            <a:schemeClr val="accent1"/>
+          </a:effectRef>
+          <a:fontRef idx="minor">
+            <a:schemeClr val="tx1"/>
+          </a:fontRef>
+        </p:style>
+      </p:cxnSp>
+      <p:sp>
+        <p:nvSpPr>
+          <p:cNvPr id="51" name="직사각형 50">
+            <a:extLst>
+              <a:ext uri="{FF2B5EF4-FFF2-40B4-BE49-F238E27FC236}">
+                <a16:creationId xmlns:a16="http://schemas.microsoft.com/office/drawing/2014/main" id="{686BD24E-1E91-4C88-A53A-539F4526B899}"/>
+              </a:ext>
+            </a:extLst>
+          </p:cNvPr>
+          <p:cNvSpPr/>
+          <p:nvPr/>
+        </p:nvSpPr>
+        <p:spPr>
+          <a:xfrm>
+            <a:off x="7280269" y="4432746"/>
+            <a:ext cx="646331" cy="369332"/>
+          </a:xfrm>
+          <a:prstGeom prst="rect">
+            <a:avLst/>
+          </a:prstGeom>
+        </p:spPr>
+        <p:txBody>
+          <a:bodyPr wrap="none">
+            <a:spAutoFit/>
+          </a:bodyPr>
+          <a:lstStyle/>
+          <a:p>
+            <a:r>
+              <a:rPr lang="ko-KR" altLang="en-US" b="1"/>
+              <a:t>위치</a:t>
+            </a:r>
+            <a:endParaRPr lang="en-US" altLang="ko-KR" b="1" dirty="0"/>
+          </a:p>
+        </p:txBody>
+      </p:sp>
+      <p:sp>
+        <p:nvSpPr>
+          <p:cNvPr id="52" name="직사각형 51">
+            <a:extLst>
+              <a:ext uri="{FF2B5EF4-FFF2-40B4-BE49-F238E27FC236}">
+                <a16:creationId xmlns:a16="http://schemas.microsoft.com/office/drawing/2014/main" id="{19612276-EC8D-451B-A13F-83D05750584A}"/>
+              </a:ext>
+            </a:extLst>
+          </p:cNvPr>
+          <p:cNvSpPr/>
+          <p:nvPr/>
+        </p:nvSpPr>
+        <p:spPr>
+          <a:xfrm>
+            <a:off x="8280095" y="4432746"/>
+            <a:ext cx="646331" cy="369332"/>
+          </a:xfrm>
+          <a:prstGeom prst="rect">
+            <a:avLst/>
+          </a:prstGeom>
+        </p:spPr>
+        <p:txBody>
+          <a:bodyPr wrap="none">
+            <a:spAutoFit/>
+          </a:bodyPr>
+          <a:lstStyle/>
+          <a:p>
+            <a:r>
+              <a:rPr lang="ko-KR" altLang="en-US" b="1" dirty="0"/>
+              <a:t>색상</a:t>
+            </a:r>
+            <a:endParaRPr lang="en-US" altLang="ko-KR" b="1" dirty="0"/>
+          </a:p>
+        </p:txBody>
+      </p:sp>
+      <p:cxnSp>
+        <p:nvCxnSpPr>
+          <p:cNvPr id="53" name="직선 화살표 연결선 52">
+            <a:extLst>
+              <a:ext uri="{FF2B5EF4-FFF2-40B4-BE49-F238E27FC236}">
+                <a16:creationId xmlns:a16="http://schemas.microsoft.com/office/drawing/2014/main" id="{941BFEEA-7863-45F5-8476-644F246B4119}"/>
+              </a:ext>
+            </a:extLst>
+          </p:cNvPr>
+          <p:cNvCxnSpPr/>
+          <p:nvPr/>
+        </p:nvCxnSpPr>
+        <p:spPr>
+          <a:xfrm>
+            <a:off x="8020950" y="1979386"/>
+            <a:ext cx="518291" cy="0"/>
+          </a:xfrm>
+          <a:prstGeom prst="straightConnector1">
+            <a:avLst/>
+          </a:prstGeom>
+          <a:ln>
+            <a:solidFill>
+              <a:schemeClr val="tx1"/>
+            </a:solidFill>
+            <a:headEnd type="triangle"/>
+            <a:tailEnd type="triangle"/>
+          </a:ln>
+        </p:spPr>
+        <p:style>
+          <a:lnRef idx="1">
+            <a:schemeClr val="accent1"/>
+          </a:lnRef>
+          <a:fillRef idx="0">
+            <a:schemeClr val="accent1"/>
+          </a:fillRef>
+          <a:effectRef idx="0">
+            <a:schemeClr val="accent1"/>
+          </a:effectRef>
+          <a:fontRef idx="minor">
+            <a:schemeClr val="tx1"/>
+          </a:fontRef>
+        </p:style>
+      </p:cxnSp>
+      <p:sp>
+        <p:nvSpPr>
+          <p:cNvPr id="54" name="직사각형 53">
+            <a:extLst>
+              <a:ext uri="{FF2B5EF4-FFF2-40B4-BE49-F238E27FC236}">
+                <a16:creationId xmlns:a16="http://schemas.microsoft.com/office/drawing/2014/main" id="{5CD6241A-E49D-470D-B935-FE3F9FDDAAE7}"/>
+              </a:ext>
+            </a:extLst>
+          </p:cNvPr>
+          <p:cNvSpPr/>
+          <p:nvPr/>
+        </p:nvSpPr>
+        <p:spPr>
+          <a:xfrm>
+            <a:off x="7470518" y="1498384"/>
+            <a:ext cx="2137445" cy="369332"/>
+          </a:xfrm>
+          <a:prstGeom prst="rect">
+            <a:avLst/>
+          </a:prstGeom>
+        </p:spPr>
+        <p:txBody>
+          <a:bodyPr wrap="none">
+            <a:spAutoFit/>
+          </a:bodyPr>
+          <a:lstStyle/>
+          <a:p>
+            <a:r>
+              <a:rPr lang="en-US" altLang="ko-KR" b="1" dirty="0"/>
+              <a:t>4 byte = </a:t>
+            </a:r>
+            <a:r>
+              <a:rPr lang="en-US" altLang="ko-KR" b="1" dirty="0" err="1"/>
+              <a:t>sizeof</a:t>
+            </a:r>
+            <a:r>
+              <a:rPr lang="en-US" altLang="ko-KR" b="1" dirty="0"/>
+              <a:t>(float)</a:t>
+            </a:r>
+          </a:p>
+        </p:txBody>
+      </p:sp>
+      <p:sp>
+        <p:nvSpPr>
+          <p:cNvPr id="55" name="타원 54">
+            <a:extLst>
+              <a:ext uri="{FF2B5EF4-FFF2-40B4-BE49-F238E27FC236}">
+                <a16:creationId xmlns:a16="http://schemas.microsoft.com/office/drawing/2014/main" id="{FE38019A-E5C5-488C-8A1A-2763EB503AF9}"/>
+              </a:ext>
+            </a:extLst>
+          </p:cNvPr>
+          <p:cNvSpPr/>
+          <p:nvPr/>
+        </p:nvSpPr>
+        <p:spPr>
+          <a:xfrm>
+            <a:off x="359229" y="2080986"/>
+            <a:ext cx="190500" cy="192516"/>
+          </a:xfrm>
+          <a:prstGeom prst="ellipse">
+            <a:avLst/>
+          </a:prstGeom>
+          <a:noFill/>
+          <a:ln>
+            <a:solidFill>
+              <a:schemeClr val="bg1"/>
+            </a:solidFill>
+          </a:ln>
+        </p:spPr>
+        <p:style>
+          <a:lnRef idx="2">
+            <a:schemeClr val="accent1">
+              <a:shade val="50000"/>
+            </a:schemeClr>
+          </a:lnRef>
+          <a:fillRef idx="1">
+            <a:schemeClr val="accent1"/>
+          </a:fillRef>
+          <a:effectRef idx="0">
+            <a:schemeClr val="accent1"/>
+          </a:effectRef>
+          <a:fontRef idx="minor">
+            <a:schemeClr val="lt1"/>
+          </a:fontRef>
+        </p:style>
+        <p:txBody>
+          <a:bodyPr rtlCol="0" anchor="ctr"/>
+          <a:lstStyle/>
+          <a:p>
+            <a:pPr algn="ctr"/>
+            <a:endParaRPr lang="ko-KR" altLang="en-US"/>
+          </a:p>
+        </p:txBody>
+      </p:sp>
+      <p:sp>
+        <p:nvSpPr>
+          <p:cNvPr id="56" name="타원 55">
+            <a:extLst>
+              <a:ext uri="{FF2B5EF4-FFF2-40B4-BE49-F238E27FC236}">
+                <a16:creationId xmlns:a16="http://schemas.microsoft.com/office/drawing/2014/main" id="{A39B4892-A6E6-4261-A483-5066F93080B7}"/>
+              </a:ext>
+            </a:extLst>
+          </p:cNvPr>
+          <p:cNvSpPr/>
+          <p:nvPr/>
+        </p:nvSpPr>
+        <p:spPr>
+          <a:xfrm>
+            <a:off x="3585029" y="2093686"/>
+            <a:ext cx="190500" cy="192516"/>
+          </a:xfrm>
+          <a:prstGeom prst="ellipse">
+            <a:avLst/>
+          </a:prstGeom>
+          <a:noFill/>
+          <a:ln>
+            <a:solidFill>
+              <a:schemeClr val="bg1"/>
+            </a:solidFill>
+          </a:ln>
+        </p:spPr>
+        <p:style>
+          <a:lnRef idx="2">
+            <a:schemeClr val="accent1">
+              <a:shade val="50000"/>
+            </a:schemeClr>
+          </a:lnRef>
+          <a:fillRef idx="1">
+            <a:schemeClr val="accent1"/>
+          </a:fillRef>
+          <a:effectRef idx="0">
+            <a:schemeClr val="accent1"/>
+          </a:effectRef>
+          <a:fontRef idx="minor">
+            <a:schemeClr val="lt1"/>
+          </a:fontRef>
+        </p:style>
+        <p:txBody>
+          <a:bodyPr rtlCol="0" anchor="ctr"/>
+          <a:lstStyle/>
+          <a:p>
+            <a:pPr algn="ctr"/>
+            <a:endParaRPr lang="ko-KR" altLang="en-US"/>
+          </a:p>
+        </p:txBody>
+      </p:sp>
+      <p:cxnSp>
+        <p:nvCxnSpPr>
+          <p:cNvPr id="57" name="연결선: 구부러짐 56">
+            <a:extLst>
+              <a:ext uri="{FF2B5EF4-FFF2-40B4-BE49-F238E27FC236}">
+                <a16:creationId xmlns:a16="http://schemas.microsoft.com/office/drawing/2014/main" id="{B8C3D14B-42D9-43AC-946F-228C829B1E27}"/>
+              </a:ext>
+            </a:extLst>
+          </p:cNvPr>
+          <p:cNvCxnSpPr>
+            <a:cxnSpLocks/>
+            <a:stCxn id="55" idx="7"/>
+            <a:endCxn id="56" idx="1"/>
+          </p:cNvCxnSpPr>
+          <p:nvPr/>
+        </p:nvCxnSpPr>
+        <p:spPr>
+          <a:xfrm rot="16200000" flipH="1">
+            <a:off x="2061029" y="569981"/>
+            <a:ext cx="12700" cy="3091096"/>
+          </a:xfrm>
+          <a:prstGeom prst="curvedConnector3">
+            <a:avLst>
+              <a:gd name="adj1" fmla="val -3221992"/>
+            </a:avLst>
+          </a:prstGeom>
+          <a:ln>
+            <a:solidFill>
+              <a:schemeClr val="tx1"/>
+            </a:solidFill>
+            <a:tailEnd type="triangle"/>
+          </a:ln>
+        </p:spPr>
+        <p:style>
+          <a:lnRef idx="1">
+            <a:schemeClr val="accent1"/>
+          </a:lnRef>
+          <a:fillRef idx="0">
+            <a:schemeClr val="accent1"/>
+          </a:fillRef>
+          <a:effectRef idx="0">
+            <a:schemeClr val="accent1"/>
+          </a:effectRef>
+          <a:fontRef idx="minor">
+            <a:schemeClr val="tx1"/>
+          </a:fontRef>
+        </p:style>
+      </p:cxnSp>
+      <p:sp>
+        <p:nvSpPr>
+          <p:cNvPr id="58" name="직사각형 57">
+            <a:extLst>
+              <a:ext uri="{FF2B5EF4-FFF2-40B4-BE49-F238E27FC236}">
+                <a16:creationId xmlns:a16="http://schemas.microsoft.com/office/drawing/2014/main" id="{917839D0-EBF8-4318-A0CB-3B174C77DE22}"/>
+              </a:ext>
+            </a:extLst>
+          </p:cNvPr>
+          <p:cNvSpPr/>
+          <p:nvPr/>
+        </p:nvSpPr>
+        <p:spPr>
+          <a:xfrm>
+            <a:off x="324534" y="879476"/>
+            <a:ext cx="6654386" cy="646331"/>
+          </a:xfrm>
+          <a:prstGeom prst="rect">
+            <a:avLst/>
+          </a:prstGeom>
+        </p:spPr>
+        <p:txBody>
+          <a:bodyPr wrap="none">
+            <a:spAutoFit/>
+          </a:bodyPr>
+          <a:lstStyle/>
+          <a:p>
+            <a:r>
+              <a:rPr lang="en-US" altLang="ko-KR" b="1" dirty="0"/>
+              <a:t>Stride: </a:t>
+            </a:r>
+            <a:r>
+              <a:rPr lang="ko-KR" altLang="en-US" b="1" dirty="0"/>
+              <a:t>다음 정점 정보를 </a:t>
+            </a:r>
+            <a:r>
+              <a:rPr lang="ko-KR" altLang="en-US" b="1" dirty="0" err="1"/>
+              <a:t>얻어오기</a:t>
+            </a:r>
+            <a:r>
+              <a:rPr lang="ko-KR" altLang="en-US" b="1" dirty="0"/>
+              <a:t> 위해 얼마나 이동해야 하는지</a:t>
+            </a:r>
+            <a:r>
+              <a:rPr lang="en-US" altLang="ko-KR" b="1" dirty="0"/>
+              <a:t>?</a:t>
+            </a:r>
+          </a:p>
+          <a:p>
+            <a:r>
+              <a:rPr lang="en-US" altLang="ko-KR" b="1" dirty="0"/>
+              <a:t>(</a:t>
+            </a:r>
+            <a:r>
+              <a:rPr lang="ko-KR" altLang="en-US" b="1" dirty="0"/>
+              <a:t>위치</a:t>
+            </a:r>
+            <a:r>
+              <a:rPr lang="en-US" altLang="ko-KR" b="1" dirty="0"/>
+              <a:t>, </a:t>
+            </a:r>
+            <a:r>
+              <a:rPr lang="ko-KR" altLang="en-US" b="1" dirty="0"/>
+              <a:t>색상 모두 </a:t>
+            </a:r>
+            <a:r>
+              <a:rPr lang="en-US" altLang="ko-KR" b="1" dirty="0"/>
+              <a:t>24 byte</a:t>
+            </a:r>
+            <a:r>
+              <a:rPr lang="ko-KR" altLang="en-US" b="1" dirty="0"/>
+              <a:t>로 동일</a:t>
+            </a:r>
+            <a:r>
+              <a:rPr lang="en-US" altLang="ko-KR" b="1" dirty="0"/>
+              <a:t>)</a:t>
+            </a:r>
+          </a:p>
+        </p:txBody>
+      </p:sp>
+      <p:cxnSp>
+        <p:nvCxnSpPr>
+          <p:cNvPr id="59" name="직선 화살표 연결선 58">
+            <a:extLst>
+              <a:ext uri="{FF2B5EF4-FFF2-40B4-BE49-F238E27FC236}">
+                <a16:creationId xmlns:a16="http://schemas.microsoft.com/office/drawing/2014/main" id="{F38DEC03-1291-4949-9D7F-B4192AB3811B}"/>
+              </a:ext>
+            </a:extLst>
+          </p:cNvPr>
+          <p:cNvCxnSpPr>
+            <a:cxnSpLocks/>
+          </p:cNvCxnSpPr>
+          <p:nvPr/>
+        </p:nvCxnSpPr>
+        <p:spPr>
+          <a:xfrm>
+            <a:off x="439220" y="2931886"/>
+            <a:ext cx="1088409" cy="0"/>
+          </a:xfrm>
+          <a:prstGeom prst="straightConnector1">
+            <a:avLst/>
+          </a:prstGeom>
+          <a:ln>
+            <a:solidFill>
+              <a:schemeClr val="tx1"/>
+            </a:solidFill>
+            <a:headEnd type="triangle"/>
+            <a:tailEnd type="triangle"/>
+          </a:ln>
+        </p:spPr>
+        <p:style>
+          <a:lnRef idx="1">
+            <a:schemeClr val="accent1"/>
+          </a:lnRef>
+          <a:fillRef idx="0">
+            <a:schemeClr val="accent1"/>
+          </a:fillRef>
+          <a:effectRef idx="0">
+            <a:schemeClr val="accent1"/>
+          </a:effectRef>
+          <a:fontRef idx="minor">
+            <a:schemeClr val="tx1"/>
+          </a:fontRef>
+        </p:style>
+      </p:cxnSp>
+      <p:sp>
+        <p:nvSpPr>
+          <p:cNvPr id="60" name="직사각형 59">
+            <a:extLst>
+              <a:ext uri="{FF2B5EF4-FFF2-40B4-BE49-F238E27FC236}">
+                <a16:creationId xmlns:a16="http://schemas.microsoft.com/office/drawing/2014/main" id="{5F72D503-D7A8-471B-9B59-578FE459B42D}"/>
+              </a:ext>
+            </a:extLst>
+          </p:cNvPr>
+          <p:cNvSpPr/>
+          <p:nvPr/>
+        </p:nvSpPr>
+        <p:spPr>
+          <a:xfrm>
+            <a:off x="411619" y="2974522"/>
+            <a:ext cx="7419980" cy="646331"/>
+          </a:xfrm>
+          <a:prstGeom prst="rect">
+            <a:avLst/>
+          </a:prstGeom>
+        </p:spPr>
+        <p:txBody>
+          <a:bodyPr wrap="none">
+            <a:spAutoFit/>
+          </a:bodyPr>
+          <a:lstStyle/>
+          <a:p>
+            <a:r>
+              <a:rPr lang="en-US" altLang="ko-KR" b="1" dirty="0"/>
+              <a:t>Offset: </a:t>
+            </a:r>
+            <a:r>
+              <a:rPr lang="ko-KR" altLang="en-US" b="1" dirty="0"/>
+              <a:t>데이터의 시작 위치가 배열의 첫 위치부터 얼마나 떨어져 있는지</a:t>
+            </a:r>
+            <a:r>
+              <a:rPr lang="en-US" altLang="ko-KR" b="1" dirty="0"/>
+              <a:t>?</a:t>
+            </a:r>
+          </a:p>
+          <a:p>
+            <a:r>
+              <a:rPr lang="en-US" altLang="ko-KR" b="1" dirty="0"/>
+              <a:t>(</a:t>
+            </a:r>
+            <a:r>
+              <a:rPr lang="ko-KR" altLang="en-US" b="1" dirty="0"/>
+              <a:t>위치의 경우 </a:t>
+            </a:r>
+            <a:r>
+              <a:rPr lang="en-US" altLang="ko-KR" b="1" dirty="0"/>
+              <a:t>0 byte,</a:t>
+            </a:r>
+            <a:r>
+              <a:rPr lang="ko-KR" altLang="en-US" b="1" dirty="0"/>
+              <a:t> 색상의 경우 </a:t>
+            </a:r>
+            <a:r>
+              <a:rPr lang="en-US" altLang="ko-KR" b="1" dirty="0"/>
+              <a:t>8 byte)</a:t>
+            </a:r>
+          </a:p>
+        </p:txBody>
+      </p:sp>
+      <p:sp>
+        <p:nvSpPr>
+          <p:cNvPr id="61" name="타원 60">
+            <a:extLst>
+              <a:ext uri="{FF2B5EF4-FFF2-40B4-BE49-F238E27FC236}">
+                <a16:creationId xmlns:a16="http://schemas.microsoft.com/office/drawing/2014/main" id="{9D31842F-379A-4417-9D92-325A5F1FDAFB}"/>
+              </a:ext>
+            </a:extLst>
+          </p:cNvPr>
+          <p:cNvSpPr/>
+          <p:nvPr/>
+        </p:nvSpPr>
+        <p:spPr>
+          <a:xfrm>
+            <a:off x="1430342" y="2080986"/>
+            <a:ext cx="190500" cy="192516"/>
+          </a:xfrm>
+          <a:prstGeom prst="ellipse">
+            <a:avLst/>
+          </a:prstGeom>
+          <a:noFill/>
+          <a:ln>
+            <a:solidFill>
+              <a:schemeClr val="bg1"/>
+            </a:solidFill>
+          </a:ln>
+        </p:spPr>
+        <p:style>
+          <a:lnRef idx="2">
+            <a:schemeClr val="accent1">
+              <a:shade val="50000"/>
+            </a:schemeClr>
+          </a:lnRef>
+          <a:fillRef idx="1">
+            <a:schemeClr val="accent1"/>
+          </a:fillRef>
+          <a:effectRef idx="0">
+            <a:schemeClr val="accent1"/>
+          </a:effectRef>
+          <a:fontRef idx="minor">
+            <a:schemeClr val="lt1"/>
+          </a:fontRef>
+        </p:style>
+        <p:txBody>
+          <a:bodyPr rtlCol="0" anchor="ctr"/>
+          <a:lstStyle/>
+          <a:p>
+            <a:pPr algn="ctr"/>
+            <a:endParaRPr lang="ko-KR" altLang="en-US"/>
+          </a:p>
+        </p:txBody>
+      </p:sp>
+      <p:sp>
+        <p:nvSpPr>
+          <p:cNvPr id="62" name="타원 61">
+            <a:extLst>
+              <a:ext uri="{FF2B5EF4-FFF2-40B4-BE49-F238E27FC236}">
+                <a16:creationId xmlns:a16="http://schemas.microsoft.com/office/drawing/2014/main" id="{4269CA55-0EB2-4E01-B5D5-C86A5B025F3F}"/>
+              </a:ext>
+            </a:extLst>
+          </p:cNvPr>
+          <p:cNvSpPr/>
+          <p:nvPr/>
+        </p:nvSpPr>
+        <p:spPr>
+          <a:xfrm>
+            <a:off x="4656142" y="2093686"/>
+            <a:ext cx="190500" cy="192516"/>
+          </a:xfrm>
+          <a:prstGeom prst="ellipse">
+            <a:avLst/>
+          </a:prstGeom>
+          <a:noFill/>
+          <a:ln>
+            <a:solidFill>
+              <a:schemeClr val="bg1"/>
+            </a:solidFill>
+          </a:ln>
+        </p:spPr>
+        <p:style>
+          <a:lnRef idx="2">
+            <a:schemeClr val="accent1">
+              <a:shade val="50000"/>
+            </a:schemeClr>
+          </a:lnRef>
+          <a:fillRef idx="1">
+            <a:schemeClr val="accent1"/>
+          </a:fillRef>
+          <a:effectRef idx="0">
+            <a:schemeClr val="accent1"/>
+          </a:effectRef>
+          <a:fontRef idx="minor">
+            <a:schemeClr val="lt1"/>
+          </a:fontRef>
+        </p:style>
+        <p:txBody>
+          <a:bodyPr rtlCol="0" anchor="ctr"/>
+          <a:lstStyle/>
+          <a:p>
+            <a:pPr algn="ctr"/>
+            <a:endParaRPr lang="ko-KR" altLang="en-US"/>
+          </a:p>
+        </p:txBody>
+      </p:sp>
+      <p:cxnSp>
+        <p:nvCxnSpPr>
+          <p:cNvPr id="63" name="연결선: 구부러짐 62">
+            <a:extLst>
+              <a:ext uri="{FF2B5EF4-FFF2-40B4-BE49-F238E27FC236}">
+                <a16:creationId xmlns:a16="http://schemas.microsoft.com/office/drawing/2014/main" id="{92BBAD29-A595-408B-9460-1001F468BD93}"/>
+              </a:ext>
+            </a:extLst>
+          </p:cNvPr>
+          <p:cNvCxnSpPr>
+            <a:cxnSpLocks/>
+            <a:stCxn id="61" idx="7"/>
+            <a:endCxn id="62" idx="1"/>
+          </p:cNvCxnSpPr>
+          <p:nvPr/>
+        </p:nvCxnSpPr>
+        <p:spPr>
+          <a:xfrm rot="16200000" flipH="1">
+            <a:off x="3132142" y="569981"/>
+            <a:ext cx="12700" cy="3091096"/>
+          </a:xfrm>
+          <a:prstGeom prst="curvedConnector3">
+            <a:avLst>
+              <a:gd name="adj1" fmla="val -3221992"/>
+            </a:avLst>
+          </a:prstGeom>
+          <a:ln>
+            <a:solidFill>
+              <a:schemeClr val="tx1"/>
+            </a:solidFill>
+            <a:tailEnd type="triangle"/>
+          </a:ln>
+        </p:spPr>
+        <p:style>
+          <a:lnRef idx="1">
+            <a:schemeClr val="accent1"/>
+          </a:lnRef>
+          <a:fillRef idx="0">
+            <a:schemeClr val="accent1"/>
+          </a:fillRef>
+          <a:effectRef idx="0">
+            <a:schemeClr val="accent1"/>
+          </a:effectRef>
+          <a:fontRef idx="minor">
+            <a:schemeClr val="tx1"/>
+          </a:fontRef>
+        </p:style>
+      </p:cxnSp>
+      <p:pic>
+        <p:nvPicPr>
+          <p:cNvPr id="64" name="그림 63">
+            <a:extLst>
+              <a:ext uri="{FF2B5EF4-FFF2-40B4-BE49-F238E27FC236}">
+                <a16:creationId xmlns:a16="http://schemas.microsoft.com/office/drawing/2014/main" id="{083B3963-9C4D-47CA-B549-C6DEB978B192}"/>
+              </a:ext>
+            </a:extLst>
+          </p:cNvPr>
+          <p:cNvPicPr>
+            <a:picLocks noChangeAspect="1"/>
+          </p:cNvPicPr>
+          <p:nvPr/>
+        </p:nvPicPr>
+        <p:blipFill>
+          <a:blip r:embed="rId2"/>
+          <a:stretch>
+            <a:fillRect/>
+          </a:stretch>
+        </p:blipFill>
+        <p:spPr>
+          <a:xfrm>
+            <a:off x="10648" y="5342381"/>
+            <a:ext cx="9376461" cy="4048095"/>
+          </a:xfrm>
+          <a:prstGeom prst="rect">
+            <a:avLst/>
+          </a:prstGeom>
+        </p:spPr>
+      </p:pic>
+    </p:spTree>
+    <p:extLst>
+      <p:ext uri="{BB962C8B-B14F-4D97-AF65-F5344CB8AC3E}">
+        <p14:creationId xmlns:p14="http://schemas.microsoft.com/office/powerpoint/2010/main" val="1887085015"/>
+      </p:ext>
+    </p:extLst>
+  </p:cSld>
+  <p:clrMapOvr>
+    <a:masterClrMapping/>
+  </p:clrMapOvr>
+</p:sld>
+</file>
+
 <file path=ppt/theme/theme1.xml><?xml version="1.0" encoding="utf-8"?>
 <a:theme xmlns:a="http://schemas.openxmlformats.org/drawingml/2006/main" name="Office 테마">
   <a:themeElements>

</xml_diff>

<commit_message>
opengl: 3d rendering with mvp transform
</commit_message>
<xml_diff>
--- a/docs/tutorial-opengl/assets/figures.pptx
+++ b/docs/tutorial-opengl/assets/figures.pptx
@@ -11,6 +11,7 @@
     <p:sldId id="259" r:id="rId5"/>
     <p:sldId id="260" r:id="rId6"/>
     <p:sldId id="261" r:id="rId7"/>
+    <p:sldId id="262" r:id="rId8"/>
   </p:sldIdLst>
   <p:sldSz cx="12192000" cy="6858000"/>
   <p:notesSz cx="6858000" cy="9144000"/>
@@ -266,7 +267,7 @@
           <a:p>
             <a:fld id="{5ED19601-7AAA-4ADB-9403-46F6CC5497EC}" type="datetimeFigureOut">
               <a:rPr lang="en-US" smtClean="0"/>
-              <a:t>7/3/2024</a:t>
+              <a:t>7/8/2024</a:t>
             </a:fld>
             <a:endParaRPr lang="en-US"/>
           </a:p>
@@ -466,7 +467,7 @@
           <a:p>
             <a:fld id="{5ED19601-7AAA-4ADB-9403-46F6CC5497EC}" type="datetimeFigureOut">
               <a:rPr lang="en-US" smtClean="0"/>
-              <a:t>7/3/2024</a:t>
+              <a:t>7/8/2024</a:t>
             </a:fld>
             <a:endParaRPr lang="en-US"/>
           </a:p>
@@ -676,7 +677,7 @@
           <a:p>
             <a:fld id="{5ED19601-7AAA-4ADB-9403-46F6CC5497EC}" type="datetimeFigureOut">
               <a:rPr lang="en-US" smtClean="0"/>
-              <a:t>7/3/2024</a:t>
+              <a:t>7/8/2024</a:t>
             </a:fld>
             <a:endParaRPr lang="en-US"/>
           </a:p>
@@ -876,7 +877,7 @@
           <a:p>
             <a:fld id="{5ED19601-7AAA-4ADB-9403-46F6CC5497EC}" type="datetimeFigureOut">
               <a:rPr lang="en-US" smtClean="0"/>
-              <a:t>7/3/2024</a:t>
+              <a:t>7/8/2024</a:t>
             </a:fld>
             <a:endParaRPr lang="en-US"/>
           </a:p>
@@ -1152,7 +1153,7 @@
           <a:p>
             <a:fld id="{5ED19601-7AAA-4ADB-9403-46F6CC5497EC}" type="datetimeFigureOut">
               <a:rPr lang="en-US" smtClean="0"/>
-              <a:t>7/3/2024</a:t>
+              <a:t>7/8/2024</a:t>
             </a:fld>
             <a:endParaRPr lang="en-US"/>
           </a:p>
@@ -1420,7 +1421,7 @@
           <a:p>
             <a:fld id="{5ED19601-7AAA-4ADB-9403-46F6CC5497EC}" type="datetimeFigureOut">
               <a:rPr lang="en-US" smtClean="0"/>
-              <a:t>7/3/2024</a:t>
+              <a:t>7/8/2024</a:t>
             </a:fld>
             <a:endParaRPr lang="en-US"/>
           </a:p>
@@ -1835,7 +1836,7 @@
           <a:p>
             <a:fld id="{5ED19601-7AAA-4ADB-9403-46F6CC5497EC}" type="datetimeFigureOut">
               <a:rPr lang="en-US" smtClean="0"/>
-              <a:t>7/3/2024</a:t>
+              <a:t>7/8/2024</a:t>
             </a:fld>
             <a:endParaRPr lang="en-US"/>
           </a:p>
@@ -1977,7 +1978,7 @@
           <a:p>
             <a:fld id="{5ED19601-7AAA-4ADB-9403-46F6CC5497EC}" type="datetimeFigureOut">
               <a:rPr lang="en-US" smtClean="0"/>
-              <a:t>7/3/2024</a:t>
+              <a:t>7/8/2024</a:t>
             </a:fld>
             <a:endParaRPr lang="en-US"/>
           </a:p>
@@ -2090,7 +2091,7 @@
           <a:p>
             <a:fld id="{5ED19601-7AAA-4ADB-9403-46F6CC5497EC}" type="datetimeFigureOut">
               <a:rPr lang="en-US" smtClean="0"/>
-              <a:t>7/3/2024</a:t>
+              <a:t>7/8/2024</a:t>
             </a:fld>
             <a:endParaRPr lang="en-US"/>
           </a:p>
@@ -2403,7 +2404,7 @@
           <a:p>
             <a:fld id="{5ED19601-7AAA-4ADB-9403-46F6CC5497EC}" type="datetimeFigureOut">
               <a:rPr lang="en-US" smtClean="0"/>
-              <a:t>7/3/2024</a:t>
+              <a:t>7/8/2024</a:t>
             </a:fld>
             <a:endParaRPr lang="en-US"/>
           </a:p>
@@ -2692,7 +2693,7 @@
           <a:p>
             <a:fld id="{5ED19601-7AAA-4ADB-9403-46F6CC5497EC}" type="datetimeFigureOut">
               <a:rPr lang="en-US" smtClean="0"/>
-              <a:t>7/3/2024</a:t>
+              <a:t>7/8/2024</a:t>
             </a:fld>
             <a:endParaRPr lang="en-US"/>
           </a:p>
@@ -2935,7 +2936,7 @@
           <a:p>
             <a:fld id="{5ED19601-7AAA-4ADB-9403-46F6CC5497EC}" type="datetimeFigureOut">
               <a:rPr lang="en-US" smtClean="0"/>
-              <a:t>7/3/2024</a:t>
+              <a:t>7/8/2024</a:t>
             </a:fld>
             <a:endParaRPr lang="en-US"/>
           </a:p>
@@ -14898,6 +14899,864 @@
 </p:sld>
 </file>
 
+<file path=ppt/slides/slide7.xml><?xml version="1.0" encoding="utf-8"?>
+<p:sld xmlns:a="http://schemas.openxmlformats.org/drawingml/2006/main" xmlns:r="http://schemas.openxmlformats.org/officeDocument/2006/relationships" xmlns:p="http://schemas.openxmlformats.org/presentationml/2006/main">
+  <p:cSld>
+    <p:spTree>
+      <p:nvGrpSpPr>
+        <p:cNvPr id="1" name=""/>
+        <p:cNvGrpSpPr/>
+        <p:nvPr/>
+      </p:nvGrpSpPr>
+      <p:grpSpPr>
+        <a:xfrm>
+          <a:off x="0" y="0"/>
+          <a:ext cx="0" cy="0"/>
+          <a:chOff x="0" y="0"/>
+          <a:chExt cx="0" cy="0"/>
+        </a:xfrm>
+      </p:grpSpPr>
+      <p:sp>
+        <p:nvSpPr>
+          <p:cNvPr id="7" name="순서도: 수동 연산 6">
+            <a:extLst>
+              <a:ext uri="{FF2B5EF4-FFF2-40B4-BE49-F238E27FC236}">
+                <a16:creationId xmlns:a16="http://schemas.microsoft.com/office/drawing/2014/main" id="{236EBB28-BF13-4EEF-AEC0-433ACEFA4140}"/>
+              </a:ext>
+            </a:extLst>
+          </p:cNvPr>
+          <p:cNvSpPr/>
+          <p:nvPr/>
+        </p:nvSpPr>
+        <p:spPr>
+          <a:xfrm rot="5400000">
+            <a:off x="4929051" y="2884714"/>
+            <a:ext cx="1454332" cy="1088572"/>
+          </a:xfrm>
+          <a:prstGeom prst="flowChartManualOperation">
+            <a:avLst/>
+          </a:prstGeom>
+        </p:spPr>
+        <p:style>
+          <a:lnRef idx="2">
+            <a:schemeClr val="dk1"/>
+          </a:lnRef>
+          <a:fillRef idx="1">
+            <a:schemeClr val="lt1"/>
+          </a:fillRef>
+          <a:effectRef idx="0">
+            <a:schemeClr val="dk1"/>
+          </a:effectRef>
+          <a:fontRef idx="minor">
+            <a:schemeClr val="dk1"/>
+          </a:fontRef>
+        </p:style>
+        <p:txBody>
+          <a:bodyPr rtlCol="0" anchor="ctr"/>
+          <a:lstStyle/>
+          <a:p>
+            <a:pPr algn="ctr"/>
+            <a:endParaRPr lang="en-US"/>
+          </a:p>
+        </p:txBody>
+      </p:sp>
+      <p:sp>
+        <p:nvSpPr>
+          <p:cNvPr id="8" name="순서도: 수동 연산 7">
+            <a:extLst>
+              <a:ext uri="{FF2B5EF4-FFF2-40B4-BE49-F238E27FC236}">
+                <a16:creationId xmlns:a16="http://schemas.microsoft.com/office/drawing/2014/main" id="{BA20B8C4-756D-4348-9949-95A09848E55F}"/>
+              </a:ext>
+            </a:extLst>
+          </p:cNvPr>
+          <p:cNvSpPr/>
+          <p:nvPr/>
+        </p:nvSpPr>
+        <p:spPr>
+          <a:xfrm rot="5400000">
+            <a:off x="6419305" y="2246811"/>
+            <a:ext cx="4008121" cy="2364378"/>
+          </a:xfrm>
+          <a:prstGeom prst="flowChartManualOperation">
+            <a:avLst/>
+          </a:prstGeom>
+        </p:spPr>
+        <p:style>
+          <a:lnRef idx="2">
+            <a:schemeClr val="dk1"/>
+          </a:lnRef>
+          <a:fillRef idx="1">
+            <a:schemeClr val="lt1"/>
+          </a:fillRef>
+          <a:effectRef idx="0">
+            <a:schemeClr val="dk1"/>
+          </a:effectRef>
+          <a:fontRef idx="minor">
+            <a:schemeClr val="dk1"/>
+          </a:fontRef>
+        </p:style>
+        <p:txBody>
+          <a:bodyPr rtlCol="0" anchor="ctr"/>
+          <a:lstStyle/>
+          <a:p>
+            <a:pPr algn="ctr"/>
+            <a:endParaRPr lang="en-US"/>
+          </a:p>
+        </p:txBody>
+      </p:sp>
+      <p:cxnSp>
+        <p:nvCxnSpPr>
+          <p:cNvPr id="10" name="직선 연결선 9">
+            <a:extLst>
+              <a:ext uri="{FF2B5EF4-FFF2-40B4-BE49-F238E27FC236}">
+                <a16:creationId xmlns:a16="http://schemas.microsoft.com/office/drawing/2014/main" id="{ADAC9A12-9C8D-4A3A-AAF7-CF41434D519E}"/>
+              </a:ext>
+            </a:extLst>
+          </p:cNvPr>
+          <p:cNvCxnSpPr/>
+          <p:nvPr/>
+        </p:nvCxnSpPr>
+        <p:spPr>
+          <a:xfrm flipV="1">
+            <a:off x="5111931" y="2238103"/>
+            <a:ext cx="2107475" cy="748937"/>
+          </a:xfrm>
+          <a:prstGeom prst="line">
+            <a:avLst/>
+          </a:prstGeom>
+          <a:ln>
+            <a:solidFill>
+              <a:schemeClr val="tx1"/>
+            </a:solidFill>
+            <a:prstDash val="dash"/>
+          </a:ln>
+        </p:spPr>
+        <p:style>
+          <a:lnRef idx="1">
+            <a:schemeClr val="accent1"/>
+          </a:lnRef>
+          <a:fillRef idx="0">
+            <a:schemeClr val="accent1"/>
+          </a:fillRef>
+          <a:effectRef idx="0">
+            <a:schemeClr val="accent1"/>
+          </a:effectRef>
+          <a:fontRef idx="minor">
+            <a:schemeClr val="tx1"/>
+          </a:fontRef>
+        </p:style>
+      </p:cxnSp>
+      <p:cxnSp>
+        <p:nvCxnSpPr>
+          <p:cNvPr id="11" name="직선 연결선 10">
+            <a:extLst>
+              <a:ext uri="{FF2B5EF4-FFF2-40B4-BE49-F238E27FC236}">
+                <a16:creationId xmlns:a16="http://schemas.microsoft.com/office/drawing/2014/main" id="{2501A204-7D4A-4212-9472-167C93C2CCC4}"/>
+              </a:ext>
+            </a:extLst>
+          </p:cNvPr>
+          <p:cNvCxnSpPr>
+            <a:cxnSpLocks/>
+          </p:cNvCxnSpPr>
+          <p:nvPr/>
+        </p:nvCxnSpPr>
+        <p:spPr>
+          <a:xfrm flipV="1">
+            <a:off x="6165667" y="1424939"/>
+            <a:ext cx="3439888" cy="1276896"/>
+          </a:xfrm>
+          <a:prstGeom prst="line">
+            <a:avLst/>
+          </a:prstGeom>
+          <a:ln>
+            <a:solidFill>
+              <a:schemeClr val="tx1"/>
+            </a:solidFill>
+            <a:prstDash val="dash"/>
+          </a:ln>
+        </p:spPr>
+        <p:style>
+          <a:lnRef idx="1">
+            <a:schemeClr val="accent1"/>
+          </a:lnRef>
+          <a:fillRef idx="0">
+            <a:schemeClr val="accent1"/>
+          </a:fillRef>
+          <a:effectRef idx="0">
+            <a:schemeClr val="accent1"/>
+          </a:effectRef>
+          <a:fontRef idx="minor">
+            <a:schemeClr val="tx1"/>
+          </a:fontRef>
+        </p:style>
+      </p:cxnSp>
+      <p:cxnSp>
+        <p:nvCxnSpPr>
+          <p:cNvPr id="13" name="직선 연결선 12">
+            <a:extLst>
+              <a:ext uri="{FF2B5EF4-FFF2-40B4-BE49-F238E27FC236}">
+                <a16:creationId xmlns:a16="http://schemas.microsoft.com/office/drawing/2014/main" id="{FDFC339E-6AC2-4B5D-BCBD-63AD730FF36B}"/>
+              </a:ext>
+            </a:extLst>
+          </p:cNvPr>
+          <p:cNvCxnSpPr>
+            <a:cxnSpLocks/>
+          </p:cNvCxnSpPr>
+          <p:nvPr/>
+        </p:nvCxnSpPr>
+        <p:spPr>
+          <a:xfrm>
+            <a:off x="5111931" y="3870961"/>
+            <a:ext cx="2107475" cy="748936"/>
+          </a:xfrm>
+          <a:prstGeom prst="line">
+            <a:avLst/>
+          </a:prstGeom>
+          <a:ln>
+            <a:solidFill>
+              <a:schemeClr val="tx1"/>
+            </a:solidFill>
+            <a:prstDash val="dash"/>
+          </a:ln>
+        </p:spPr>
+        <p:style>
+          <a:lnRef idx="1">
+            <a:schemeClr val="accent1"/>
+          </a:lnRef>
+          <a:fillRef idx="0">
+            <a:schemeClr val="accent1"/>
+          </a:fillRef>
+          <a:effectRef idx="0">
+            <a:schemeClr val="accent1"/>
+          </a:effectRef>
+          <a:fontRef idx="minor">
+            <a:schemeClr val="tx1"/>
+          </a:fontRef>
+        </p:style>
+      </p:cxnSp>
+      <p:cxnSp>
+        <p:nvCxnSpPr>
+          <p:cNvPr id="16" name="직선 연결선 15">
+            <a:extLst>
+              <a:ext uri="{FF2B5EF4-FFF2-40B4-BE49-F238E27FC236}">
+                <a16:creationId xmlns:a16="http://schemas.microsoft.com/office/drawing/2014/main" id="{25E0F5C2-87B2-48EE-8485-6AADA364827A}"/>
+              </a:ext>
+            </a:extLst>
+          </p:cNvPr>
+          <p:cNvCxnSpPr>
+            <a:cxnSpLocks/>
+          </p:cNvCxnSpPr>
+          <p:nvPr/>
+        </p:nvCxnSpPr>
+        <p:spPr>
+          <a:xfrm>
+            <a:off x="6200504" y="4156166"/>
+            <a:ext cx="3405051" cy="1276895"/>
+          </a:xfrm>
+          <a:prstGeom prst="line">
+            <a:avLst/>
+          </a:prstGeom>
+          <a:ln>
+            <a:solidFill>
+              <a:schemeClr val="tx1"/>
+            </a:solidFill>
+            <a:prstDash val="dash"/>
+          </a:ln>
+        </p:spPr>
+        <p:style>
+          <a:lnRef idx="1">
+            <a:schemeClr val="accent1"/>
+          </a:lnRef>
+          <a:fillRef idx="0">
+            <a:schemeClr val="accent1"/>
+          </a:fillRef>
+          <a:effectRef idx="0">
+            <a:schemeClr val="accent1"/>
+          </a:effectRef>
+          <a:fontRef idx="minor">
+            <a:schemeClr val="tx1"/>
+          </a:fontRef>
+        </p:style>
+      </p:cxnSp>
+      <p:sp>
+        <p:nvSpPr>
+          <p:cNvPr id="23" name="순서도: 수동 연산 22">
+            <a:extLst>
+              <a:ext uri="{FF2B5EF4-FFF2-40B4-BE49-F238E27FC236}">
+                <a16:creationId xmlns:a16="http://schemas.microsoft.com/office/drawing/2014/main" id="{1328D246-D5AB-4576-86B7-8244F41D3394}"/>
+              </a:ext>
+            </a:extLst>
+          </p:cNvPr>
+          <p:cNvSpPr/>
+          <p:nvPr/>
+        </p:nvSpPr>
+        <p:spPr>
+          <a:xfrm rot="5400000">
+            <a:off x="4852578" y="3468019"/>
+            <a:ext cx="679813" cy="707573"/>
+          </a:xfrm>
+          <a:prstGeom prst="flowChartManualOperation">
+            <a:avLst/>
+          </a:prstGeom>
+          <a:gradFill flip="none" rotWithShape="1">
+            <a:gsLst>
+              <a:gs pos="0">
+                <a:srgbClr val="FF0000"/>
+              </a:gs>
+              <a:gs pos="50000">
+                <a:schemeClr val="lt1">
+                  <a:shade val="67500"/>
+                  <a:satMod val="115000"/>
+                </a:schemeClr>
+              </a:gs>
+              <a:gs pos="100000">
+                <a:srgbClr val="0000FF"/>
+              </a:gs>
+            </a:gsLst>
+            <a:lin ang="5400000" scaled="1"/>
+            <a:tileRect/>
+          </a:gradFill>
+        </p:spPr>
+        <p:style>
+          <a:lnRef idx="2">
+            <a:schemeClr val="dk1"/>
+          </a:lnRef>
+          <a:fillRef idx="1">
+            <a:schemeClr val="lt1"/>
+          </a:fillRef>
+          <a:effectRef idx="0">
+            <a:schemeClr val="dk1"/>
+          </a:effectRef>
+          <a:fontRef idx="minor">
+            <a:schemeClr val="dk1"/>
+          </a:fontRef>
+        </p:style>
+        <p:txBody>
+          <a:bodyPr rtlCol="0" anchor="ctr"/>
+          <a:lstStyle/>
+          <a:p>
+            <a:pPr algn="ctr"/>
+            <a:endParaRPr lang="en-US"/>
+          </a:p>
+        </p:txBody>
+      </p:sp>
+      <p:grpSp>
+        <p:nvGrpSpPr>
+          <p:cNvPr id="21" name="그룹 20">
+            <a:extLst>
+              <a:ext uri="{FF2B5EF4-FFF2-40B4-BE49-F238E27FC236}">
+                <a16:creationId xmlns:a16="http://schemas.microsoft.com/office/drawing/2014/main" id="{BD96698F-0591-4218-9305-E2C6F259615E}"/>
+              </a:ext>
+            </a:extLst>
+          </p:cNvPr>
+          <p:cNvGrpSpPr/>
+          <p:nvPr/>
+        </p:nvGrpSpPr>
+        <p:grpSpPr>
+          <a:xfrm>
+            <a:off x="4417423" y="3320142"/>
+            <a:ext cx="740228" cy="261257"/>
+            <a:chOff x="4075611" y="3283131"/>
+            <a:chExt cx="740228" cy="261257"/>
+          </a:xfrm>
+        </p:grpSpPr>
+        <p:sp>
+          <p:nvSpPr>
+            <p:cNvPr id="19" name="직사각형 18">
+              <a:extLst>
+                <a:ext uri="{FF2B5EF4-FFF2-40B4-BE49-F238E27FC236}">
+                  <a16:creationId xmlns:a16="http://schemas.microsoft.com/office/drawing/2014/main" id="{1E027385-9B57-4FAF-9FFA-DCA31D4D650F}"/>
+                </a:ext>
+              </a:extLst>
+            </p:cNvPr>
+            <p:cNvSpPr/>
+            <p:nvPr/>
+          </p:nvSpPr>
+          <p:spPr>
+            <a:xfrm>
+              <a:off x="4075611" y="3291840"/>
+              <a:ext cx="444138" cy="243840"/>
+            </a:xfrm>
+            <a:prstGeom prst="rect">
+              <a:avLst/>
+            </a:prstGeom>
+          </p:spPr>
+          <p:style>
+            <a:lnRef idx="2">
+              <a:schemeClr val="dk1"/>
+            </a:lnRef>
+            <a:fillRef idx="1">
+              <a:schemeClr val="lt1"/>
+            </a:fillRef>
+            <a:effectRef idx="0">
+              <a:schemeClr val="dk1"/>
+            </a:effectRef>
+            <a:fontRef idx="minor">
+              <a:schemeClr val="dk1"/>
+            </a:fontRef>
+          </p:style>
+          <p:txBody>
+            <a:bodyPr rtlCol="0" anchor="ctr"/>
+            <a:lstStyle/>
+            <a:p>
+              <a:pPr algn="ctr"/>
+              <a:endParaRPr lang="en-US"/>
+            </a:p>
+          </p:txBody>
+        </p:sp>
+        <p:sp>
+          <p:nvSpPr>
+            <p:cNvPr id="20" name="이등변 삼각형 19">
+              <a:extLst>
+                <a:ext uri="{FF2B5EF4-FFF2-40B4-BE49-F238E27FC236}">
+                  <a16:creationId xmlns:a16="http://schemas.microsoft.com/office/drawing/2014/main" id="{95271D0C-299E-471E-BD83-A08B51DAF8E5}"/>
+                </a:ext>
+              </a:extLst>
+            </p:cNvPr>
+            <p:cNvSpPr/>
+            <p:nvPr/>
+          </p:nvSpPr>
+          <p:spPr>
+            <a:xfrm rot="16200000">
+              <a:off x="4545873" y="3274422"/>
+              <a:ext cx="261257" cy="278675"/>
+            </a:xfrm>
+            <a:prstGeom prst="triangle">
+              <a:avLst/>
+            </a:prstGeom>
+          </p:spPr>
+          <p:style>
+            <a:lnRef idx="2">
+              <a:schemeClr val="dk1"/>
+            </a:lnRef>
+            <a:fillRef idx="1">
+              <a:schemeClr val="lt1"/>
+            </a:fillRef>
+            <a:effectRef idx="0">
+              <a:schemeClr val="dk1"/>
+            </a:effectRef>
+            <a:fontRef idx="minor">
+              <a:schemeClr val="dk1"/>
+            </a:fontRef>
+          </p:style>
+          <p:txBody>
+            <a:bodyPr rtlCol="0" anchor="ctr"/>
+            <a:lstStyle/>
+            <a:p>
+              <a:pPr algn="ctr"/>
+              <a:endParaRPr lang="en-US"/>
+            </a:p>
+          </p:txBody>
+        </p:sp>
+      </p:grpSp>
+      <p:sp>
+        <p:nvSpPr>
+          <p:cNvPr id="24" name="타원 23">
+            <a:extLst>
+              <a:ext uri="{FF2B5EF4-FFF2-40B4-BE49-F238E27FC236}">
+                <a16:creationId xmlns:a16="http://schemas.microsoft.com/office/drawing/2014/main" id="{57E1FB1E-2D35-4C61-821D-27D85B56C004}"/>
+              </a:ext>
+            </a:extLst>
+          </p:cNvPr>
+          <p:cNvSpPr/>
+          <p:nvPr/>
+        </p:nvSpPr>
+        <p:spPr>
+          <a:xfrm>
+            <a:off x="4576354" y="3384592"/>
+            <a:ext cx="143691" cy="143691"/>
+          </a:xfrm>
+          <a:prstGeom prst="ellipse">
+            <a:avLst/>
+          </a:prstGeom>
+        </p:spPr>
+        <p:style>
+          <a:lnRef idx="2">
+            <a:schemeClr val="dk1">
+              <a:shade val="50000"/>
+            </a:schemeClr>
+          </a:lnRef>
+          <a:fillRef idx="1">
+            <a:schemeClr val="dk1"/>
+          </a:fillRef>
+          <a:effectRef idx="0">
+            <a:schemeClr val="dk1"/>
+          </a:effectRef>
+          <a:fontRef idx="minor">
+            <a:schemeClr val="lt1"/>
+          </a:fontRef>
+        </p:style>
+        <p:txBody>
+          <a:bodyPr rtlCol="0" anchor="ctr"/>
+          <a:lstStyle/>
+          <a:p>
+            <a:pPr algn="ctr"/>
+            <a:endParaRPr lang="en-US"/>
+          </a:p>
+        </p:txBody>
+      </p:sp>
+      <p:sp>
+        <p:nvSpPr>
+          <p:cNvPr id="25" name="TextBox 24">
+            <a:extLst>
+              <a:ext uri="{FF2B5EF4-FFF2-40B4-BE49-F238E27FC236}">
+                <a16:creationId xmlns:a16="http://schemas.microsoft.com/office/drawing/2014/main" id="{566D0C40-8C12-4B47-A907-390FF66F7B4B}"/>
+              </a:ext>
+            </a:extLst>
+          </p:cNvPr>
+          <p:cNvSpPr txBox="1"/>
+          <p:nvPr/>
+        </p:nvSpPr>
+        <p:spPr>
+          <a:xfrm>
+            <a:off x="3587386" y="2668701"/>
+            <a:ext cx="925286" cy="646331"/>
+          </a:xfrm>
+          <a:prstGeom prst="rect">
+            <a:avLst/>
+          </a:prstGeom>
+          <a:noFill/>
+        </p:spPr>
+        <p:txBody>
+          <a:bodyPr wrap="square" rtlCol="0">
+            <a:spAutoFit/>
+          </a:bodyPr>
+          <a:lstStyle/>
+          <a:p>
+            <a:pPr algn="ctr"/>
+            <a:r>
+              <a:rPr lang="en-US" dirty="0"/>
+              <a:t>Camera</a:t>
+            </a:r>
+          </a:p>
+          <a:p>
+            <a:pPr algn="ctr"/>
+            <a:r>
+              <a:rPr lang="en-US" dirty="0"/>
+              <a:t>(0,1,0)</a:t>
+            </a:r>
+          </a:p>
+        </p:txBody>
+      </p:sp>
+      <p:sp>
+        <p:nvSpPr>
+          <p:cNvPr id="26" name="TextBox 25">
+            <a:extLst>
+              <a:ext uri="{FF2B5EF4-FFF2-40B4-BE49-F238E27FC236}">
+                <a16:creationId xmlns:a16="http://schemas.microsoft.com/office/drawing/2014/main" id="{9FAE4C38-9839-4C42-B70E-CE006EAFF23E}"/>
+              </a:ext>
+            </a:extLst>
+          </p:cNvPr>
+          <p:cNvSpPr txBox="1"/>
+          <p:nvPr/>
+        </p:nvSpPr>
+        <p:spPr>
+          <a:xfrm>
+            <a:off x="5448843" y="4327859"/>
+            <a:ext cx="925286" cy="646331"/>
+          </a:xfrm>
+          <a:prstGeom prst="rect">
+            <a:avLst/>
+          </a:prstGeom>
+          <a:noFill/>
+        </p:spPr>
+        <p:txBody>
+          <a:bodyPr wrap="square" rtlCol="0">
+            <a:spAutoFit/>
+          </a:bodyPr>
+          <a:lstStyle/>
+          <a:p>
+            <a:pPr algn="ctr"/>
+            <a:r>
+              <a:rPr lang="en-US" dirty="0"/>
+              <a:t>Near</a:t>
+            </a:r>
+          </a:p>
+          <a:p>
+            <a:pPr algn="ctr"/>
+            <a:r>
+              <a:rPr lang="en-US" dirty="0"/>
+              <a:t>Z=0.1</a:t>
+            </a:r>
+          </a:p>
+        </p:txBody>
+      </p:sp>
+      <p:sp>
+        <p:nvSpPr>
+          <p:cNvPr id="27" name="TextBox 26">
+            <a:extLst>
+              <a:ext uri="{FF2B5EF4-FFF2-40B4-BE49-F238E27FC236}">
+                <a16:creationId xmlns:a16="http://schemas.microsoft.com/office/drawing/2014/main" id="{C3ABFBBB-E361-446A-87D7-0B6712E1040A}"/>
+              </a:ext>
+            </a:extLst>
+          </p:cNvPr>
+          <p:cNvSpPr txBox="1"/>
+          <p:nvPr/>
+        </p:nvSpPr>
+        <p:spPr>
+          <a:xfrm>
+            <a:off x="9142912" y="5513895"/>
+            <a:ext cx="925286" cy="646331"/>
+          </a:xfrm>
+          <a:prstGeom prst="rect">
+            <a:avLst/>
+          </a:prstGeom>
+          <a:noFill/>
+        </p:spPr>
+        <p:txBody>
+          <a:bodyPr wrap="square" rtlCol="0">
+            <a:spAutoFit/>
+          </a:bodyPr>
+          <a:lstStyle/>
+          <a:p>
+            <a:pPr algn="ctr"/>
+            <a:r>
+              <a:rPr lang="en-US" dirty="0"/>
+              <a:t>Near</a:t>
+            </a:r>
+          </a:p>
+          <a:p>
+            <a:pPr algn="ctr"/>
+            <a:r>
+              <a:rPr lang="en-US" dirty="0"/>
+              <a:t>Z=100</a:t>
+            </a:r>
+          </a:p>
+        </p:txBody>
+      </p:sp>
+      <p:cxnSp>
+        <p:nvCxnSpPr>
+          <p:cNvPr id="29" name="연결선: 구부러짐 28">
+            <a:extLst>
+              <a:ext uri="{FF2B5EF4-FFF2-40B4-BE49-F238E27FC236}">
+                <a16:creationId xmlns:a16="http://schemas.microsoft.com/office/drawing/2014/main" id="{D8D8CC53-3117-4690-9122-883F412FEDA7}"/>
+              </a:ext>
+            </a:extLst>
+          </p:cNvPr>
+          <p:cNvCxnSpPr>
+            <a:stCxn id="24" idx="0"/>
+            <a:endCxn id="25" idx="3"/>
+          </p:cNvCxnSpPr>
+          <p:nvPr/>
+        </p:nvCxnSpPr>
+        <p:spPr>
+          <a:xfrm rot="16200000" flipV="1">
+            <a:off x="4384074" y="3120466"/>
+            <a:ext cx="392725" cy="135528"/>
+          </a:xfrm>
+          <a:prstGeom prst="curvedConnector2">
+            <a:avLst/>
+          </a:prstGeom>
+          <a:ln>
+            <a:solidFill>
+              <a:schemeClr val="tx1"/>
+            </a:solidFill>
+            <a:tailEnd type="triangle"/>
+          </a:ln>
+        </p:spPr>
+        <p:style>
+          <a:lnRef idx="1">
+            <a:schemeClr val="accent1"/>
+          </a:lnRef>
+          <a:fillRef idx="0">
+            <a:schemeClr val="accent1"/>
+          </a:fillRef>
+          <a:effectRef idx="0">
+            <a:schemeClr val="accent1"/>
+          </a:effectRef>
+          <a:fontRef idx="minor">
+            <a:schemeClr val="tx1"/>
+          </a:fontRef>
+        </p:style>
+      </p:cxnSp>
+      <p:sp>
+        <p:nvSpPr>
+          <p:cNvPr id="30" name="TextBox 29">
+            <a:extLst>
+              <a:ext uri="{FF2B5EF4-FFF2-40B4-BE49-F238E27FC236}">
+                <a16:creationId xmlns:a16="http://schemas.microsoft.com/office/drawing/2014/main" id="{9B665267-6982-468D-BDCF-F3BD20FF3F06}"/>
+              </a:ext>
+            </a:extLst>
+          </p:cNvPr>
+          <p:cNvSpPr txBox="1"/>
+          <p:nvPr/>
+        </p:nvSpPr>
+        <p:spPr>
+          <a:xfrm>
+            <a:off x="3587386" y="4239582"/>
+            <a:ext cx="1544472" cy="646331"/>
+          </a:xfrm>
+          <a:prstGeom prst="rect">
+            <a:avLst/>
+          </a:prstGeom>
+          <a:noFill/>
+        </p:spPr>
+        <p:txBody>
+          <a:bodyPr wrap="square" rtlCol="0">
+            <a:spAutoFit/>
+          </a:bodyPr>
+          <a:lstStyle/>
+          <a:p>
+            <a:pPr algn="ctr"/>
+            <a:r>
+              <a:rPr lang="en-US" dirty="0"/>
+              <a:t>Square</a:t>
+            </a:r>
+          </a:p>
+          <a:p>
+            <a:pPr algn="ctr"/>
+            <a:r>
+              <a:rPr lang="en-US" dirty="0"/>
+              <a:t>(-0.5,-0.5,</a:t>
+            </a:r>
+            <a:r>
+              <a:rPr lang="en-US" b="1" u="sng" dirty="0"/>
+              <a:t>0.0</a:t>
+            </a:r>
+            <a:r>
+              <a:rPr lang="en-US" dirty="0"/>
+              <a:t>)</a:t>
+            </a:r>
+          </a:p>
+        </p:txBody>
+      </p:sp>
+      <p:sp>
+        <p:nvSpPr>
+          <p:cNvPr id="31" name="타원 30">
+            <a:extLst>
+              <a:ext uri="{FF2B5EF4-FFF2-40B4-BE49-F238E27FC236}">
+                <a16:creationId xmlns:a16="http://schemas.microsoft.com/office/drawing/2014/main" id="{E61F638E-BA18-4653-94BE-81D7DB9539A4}"/>
+              </a:ext>
+            </a:extLst>
+          </p:cNvPr>
+          <p:cNvSpPr/>
+          <p:nvPr/>
+        </p:nvSpPr>
+        <p:spPr>
+          <a:xfrm>
+            <a:off x="4766852" y="3958606"/>
+            <a:ext cx="143691" cy="143691"/>
+          </a:xfrm>
+          <a:prstGeom prst="ellipse">
+            <a:avLst/>
+          </a:prstGeom>
+        </p:spPr>
+        <p:style>
+          <a:lnRef idx="2">
+            <a:schemeClr val="dk1">
+              <a:shade val="50000"/>
+            </a:schemeClr>
+          </a:lnRef>
+          <a:fillRef idx="1">
+            <a:schemeClr val="dk1"/>
+          </a:fillRef>
+          <a:effectRef idx="0">
+            <a:schemeClr val="dk1"/>
+          </a:effectRef>
+          <a:fontRef idx="minor">
+            <a:schemeClr val="lt1"/>
+          </a:fontRef>
+        </p:style>
+        <p:txBody>
+          <a:bodyPr rtlCol="0" anchor="ctr"/>
+          <a:lstStyle/>
+          <a:p>
+            <a:pPr algn="ctr"/>
+            <a:endParaRPr lang="en-US"/>
+          </a:p>
+        </p:txBody>
+      </p:sp>
+      <p:cxnSp>
+        <p:nvCxnSpPr>
+          <p:cNvPr id="32" name="연결선: 구부러짐 31">
+            <a:extLst>
+              <a:ext uri="{FF2B5EF4-FFF2-40B4-BE49-F238E27FC236}">
+                <a16:creationId xmlns:a16="http://schemas.microsoft.com/office/drawing/2014/main" id="{0CF9D7E6-9E9B-4135-8875-64014845537A}"/>
+              </a:ext>
+            </a:extLst>
+          </p:cNvPr>
+          <p:cNvCxnSpPr>
+            <a:cxnSpLocks/>
+            <a:stCxn id="31" idx="4"/>
+            <a:endCxn id="30" idx="0"/>
+          </p:cNvCxnSpPr>
+          <p:nvPr/>
+        </p:nvCxnSpPr>
+        <p:spPr>
+          <a:xfrm rot="5400000">
+            <a:off x="4530518" y="3931401"/>
+            <a:ext cx="137285" cy="479076"/>
+          </a:xfrm>
+          <a:prstGeom prst="curvedConnector3">
+            <a:avLst>
+              <a:gd name="adj1" fmla="val 50000"/>
+            </a:avLst>
+          </a:prstGeom>
+          <a:ln>
+            <a:solidFill>
+              <a:schemeClr val="tx1"/>
+            </a:solidFill>
+            <a:tailEnd type="triangle"/>
+          </a:ln>
+        </p:spPr>
+        <p:style>
+          <a:lnRef idx="1">
+            <a:schemeClr val="accent1"/>
+          </a:lnRef>
+          <a:fillRef idx="0">
+            <a:schemeClr val="accent1"/>
+          </a:fillRef>
+          <a:effectRef idx="0">
+            <a:schemeClr val="accent1"/>
+          </a:effectRef>
+          <a:fontRef idx="minor">
+            <a:schemeClr val="tx1"/>
+          </a:fontRef>
+        </p:style>
+      </p:cxnSp>
+      <p:pic>
+        <p:nvPicPr>
+          <p:cNvPr id="35" name="그림 34">
+            <a:extLst>
+              <a:ext uri="{FF2B5EF4-FFF2-40B4-BE49-F238E27FC236}">
+                <a16:creationId xmlns:a16="http://schemas.microsoft.com/office/drawing/2014/main" id="{FA20A89C-747E-4A3C-B8D6-0E095AAD0807}"/>
+              </a:ext>
+            </a:extLst>
+          </p:cNvPr>
+          <p:cNvPicPr>
+            <a:picLocks noChangeAspect="1"/>
+          </p:cNvPicPr>
+          <p:nvPr/>
+        </p:nvPicPr>
+        <p:blipFill>
+          <a:blip r:embed="rId2"/>
+          <a:stretch>
+            <a:fillRect/>
+          </a:stretch>
+        </p:blipFill>
+        <p:spPr>
+          <a:xfrm>
+            <a:off x="10068198" y="1750617"/>
+            <a:ext cx="6523285" cy="4840644"/>
+          </a:xfrm>
+          <a:prstGeom prst="rect">
+            <a:avLst/>
+          </a:prstGeom>
+        </p:spPr>
+      </p:pic>
+    </p:spTree>
+    <p:extLst>
+      <p:ext uri="{BB962C8B-B14F-4D97-AF65-F5344CB8AC3E}">
+        <p14:creationId xmlns:p14="http://schemas.microsoft.com/office/powerpoint/2010/main" val="3238106369"/>
+      </p:ext>
+    </p:extLst>
+  </p:cSld>
+  <p:clrMapOvr>
+    <a:masterClrMapping/>
+  </p:clrMapOvr>
+</p:sld>
+</file>
+
 <file path=ppt/theme/theme1.xml><?xml version="1.0" encoding="utf-8"?>
 <a:theme xmlns:a="http://schemas.openxmlformats.org/drawingml/2006/main" name="Office 테마">
   <a:themeElements>

</xml_diff>